<commit_message>
Add some clarifications and notes for many slides
</commit_message>
<xml_diff>
--- a/presentations/Globalisierung.pptx
+++ b/presentations/Globalisierung.pptx
@@ -6,10 +6,10 @@
     <p:sldMasterId id="2147483656" r:id="rId2"/>
   </p:sldMasterIdLst>
   <p:notesMasterIdLst>
-    <p:notesMasterId r:id="rId14"/>
+    <p:notesMasterId r:id="rId15"/>
   </p:notesMasterIdLst>
   <p:handoutMasterIdLst>
-    <p:handoutMasterId r:id="rId15"/>
+    <p:handoutMasterId r:id="rId16"/>
   </p:handoutMasterIdLst>
   <p:sldIdLst>
     <p:sldId id="256" r:id="rId3"/>
@@ -20,9 +20,10 @@
     <p:sldId id="264" r:id="rId8"/>
     <p:sldId id="265" r:id="rId9"/>
     <p:sldId id="266" r:id="rId10"/>
-    <p:sldId id="263" r:id="rId11"/>
-    <p:sldId id="258" r:id="rId12"/>
-    <p:sldId id="259" r:id="rId13"/>
+    <p:sldId id="267" r:id="rId11"/>
+    <p:sldId id="263" r:id="rId12"/>
+    <p:sldId id="258" r:id="rId13"/>
+    <p:sldId id="259" r:id="rId14"/>
   </p:sldIdLst>
   <p:sldSz cx="12192000" cy="6858000"/>
   <p:notesSz cx="6858000" cy="9144000"/>
@@ -146,6 +147,7 @@
             <p14:sldId id="264"/>
             <p14:sldId id="265"/>
             <p14:sldId id="266"/>
+            <p14:sldId id="267"/>
             <p14:sldId id="263"/>
           </p14:sldIdLst>
         </p14:section>
@@ -268,7 +270,7 @@
                   <a:schemeClr val="tx2"/>
                 </a:solidFill>
               </a:rPr>
-              <a:t>07.04.2022</a:t>
+              <a:t>01.06.2023</a:t>
             </a:fld>
             <a:endParaRPr lang="de-DE">
               <a:solidFill>
@@ -346,7 +348,7 @@
                   <a:schemeClr val="tx2"/>
                 </a:solidFill>
               </a:rPr>
-              <a:t>‹Nr.›</a:t>
+              <a:t>‹#›</a:t>
             </a:fld>
             <a:endParaRPr lang="de-DE">
               <a:solidFill>
@@ -618,7 +620,7 @@
             <a:fld id="{B4113CCE-1A1A-46DB-884A-AE560F65C3AF}" type="datetimeFigureOut">
               <a:rPr lang="de-DE" smtClean="0"/>
               <a:pPr/>
-              <a:t>07.04.2022</a:t>
+              <a:t>01.06.2023</a:t>
             </a:fld>
             <a:endParaRPr lang="de-DE"/>
           </a:p>
@@ -785,7 +787,7 @@
             <a:fld id="{927DBD90-B360-417B-B4B3-F05A4AFC1996}" type="slidenum">
               <a:rPr lang="de-DE" smtClean="0"/>
               <a:pPr/>
-              <a:t>‹Nr.›</a:t>
+              <a:t>‹#›</a:t>
             </a:fld>
             <a:endParaRPr lang="de-DE"/>
           </a:p>
@@ -1165,7 +1167,7 @@
       </p:grpSpPr>
       <p:sp>
         <p:nvSpPr>
-          <p:cNvPr id="2" name="Folienbildplatzhalter 1"/>
+          <p:cNvPr id="2" name="Slide Image Placeholder 1"/>
           <p:cNvSpPr>
             <a:spLocks noGrp="1" noRot="1" noChangeAspect="1"/>
           </p:cNvSpPr>
@@ -1182,7 +1184,7 @@
       </p:sp>
       <p:sp>
         <p:nvSpPr>
-          <p:cNvPr id="3" name="Notizenplatzhalter 2"/>
+          <p:cNvPr id="3" name="Notes Placeholder 2"/>
           <p:cNvSpPr>
             <a:spLocks noGrp="1"/>
           </p:cNvSpPr>
@@ -1195,18 +1197,33 @@
           <a:bodyPr/>
           <a:lstStyle/>
           <a:p>
-            <a:endParaRPr lang="de-DE"/>
-          </a:p>
-        </p:txBody>
-      </p:sp>
-      <p:sp>
-        <p:nvSpPr>
-          <p:cNvPr id="4" name="Foliennummernplatzhalter 3"/>
-          <p:cNvSpPr>
-            <a:spLocks noGrp="1"/>
-          </p:cNvSpPr>
-          <p:nvPr>
-            <p:ph type="sldNum" sz="quarter" idx="10"/>
+            <a:r>
+              <a:rPr lang="de-DE" dirty="0"/>
+              <a:t>Für die Lokalisierung brauchen wir Bibliotheken.</a:t>
+            </a:r>
+          </a:p>
+          <a:p>
+            <a:r>
+              <a:rPr lang="de-DE" dirty="0"/>
+              <a:t>Während der Entwicklung brauchen wir noch einen sog. Build_Runner, der bei jedem Compilier-Vorgang auch die Übersetzungen in eine Dart-Datei schreibt.</a:t>
+            </a:r>
+          </a:p>
+          <a:p>
+            <a:r>
+              <a:rPr lang="de-DE" dirty="0"/>
+              <a:t>Damit das passiert, muss man Flutter sagen, dass diese Generierung stattfinden soll.</a:t>
+            </a:r>
+          </a:p>
+        </p:txBody>
+      </p:sp>
+      <p:sp>
+        <p:nvSpPr>
+          <p:cNvPr id="4" name="Slide Number Placeholder 3"/>
+          <p:cNvSpPr>
+            <a:spLocks noGrp="1"/>
+          </p:cNvSpPr>
+          <p:nvPr>
+            <p:ph type="sldNum" sz="quarter" idx="5"/>
           </p:nvPr>
         </p:nvSpPr>
         <p:spPr/>
@@ -1216,7 +1233,535 @@
           <a:p>
             <a:fld id="{927DBD90-B360-417B-B4B3-F05A4AFC1996}" type="slidenum">
               <a:rPr lang="de-DE" smtClean="0"/>
-              <a:t>11</a:t>
+              <a:pPr/>
+              <a:t>5</a:t>
+            </a:fld>
+            <a:endParaRPr lang="de-DE"/>
+          </a:p>
+        </p:txBody>
+      </p:sp>
+    </p:spTree>
+    <p:extLst>
+      <p:ext uri="{BB962C8B-B14F-4D97-AF65-F5344CB8AC3E}">
+        <p14:creationId xmlns:p14="http://schemas.microsoft.com/office/powerpoint/2010/main" val="1756249300"/>
+      </p:ext>
+    </p:extLst>
+  </p:cSld>
+  <p:clrMapOvr>
+    <a:masterClrMapping/>
+  </p:clrMapOvr>
+</p:notes>
+</file>
+
+<file path=ppt/notesSlides/notesSlide3.xml><?xml version="1.0" encoding="utf-8"?>
+<p:notes xmlns:a="http://schemas.openxmlformats.org/drawingml/2006/main" xmlns:r="http://schemas.openxmlformats.org/officeDocument/2006/relationships" xmlns:p="http://schemas.openxmlformats.org/presentationml/2006/main">
+  <p:cSld>
+    <p:spTree>
+      <p:nvGrpSpPr>
+        <p:cNvPr id="1" name=""/>
+        <p:cNvGrpSpPr/>
+        <p:nvPr/>
+      </p:nvGrpSpPr>
+      <p:grpSpPr>
+        <a:xfrm>
+          <a:off x="0" y="0"/>
+          <a:ext cx="0" cy="0"/>
+          <a:chOff x="0" y="0"/>
+          <a:chExt cx="0" cy="0"/>
+        </a:xfrm>
+      </p:grpSpPr>
+      <p:sp>
+        <p:nvSpPr>
+          <p:cNvPr id="2" name="Slide Image Placeholder 1"/>
+          <p:cNvSpPr>
+            <a:spLocks noGrp="1" noRot="1" noChangeAspect="1"/>
+          </p:cNvSpPr>
+          <p:nvPr>
+            <p:ph type="sldImg"/>
+          </p:nvPr>
+        </p:nvSpPr>
+        <p:spPr>
+          <a:xfrm>
+            <a:off x="685800" y="1143000"/>
+            <a:ext cx="4270375" cy="2401888"/>
+          </a:xfrm>
+        </p:spPr>
+      </p:sp>
+      <p:sp>
+        <p:nvSpPr>
+          <p:cNvPr id="3" name="Notes Placeholder 2"/>
+          <p:cNvSpPr>
+            <a:spLocks noGrp="1"/>
+          </p:cNvSpPr>
+          <p:nvPr>
+            <p:ph type="body" idx="1"/>
+          </p:nvPr>
+        </p:nvSpPr>
+        <p:spPr/>
+        <p:txBody>
+          <a:bodyPr/>
+          <a:lstStyle/>
+          <a:p>
+            <a:r>
+              <a:rPr lang="de-DE" dirty="0"/>
+              <a:t>Die l10n.yaml Datei liegt hinterher neben der pubspec.yaml</a:t>
+            </a:r>
+          </a:p>
+          <a:p>
+            <a:r>
+              <a:rPr lang="de-DE" dirty="0"/>
+              <a:t>Arb-dir legt fest, wo die Übersetzungsdateien liegen sollen. Diese möchten wir nicht mit unseren Klassen mischen, daher packen wir sie in einen Unterordner.</a:t>
+            </a:r>
+          </a:p>
+          <a:p>
+            <a:r>
+              <a:rPr lang="de-DE" dirty="0"/>
+              <a:t>Template-arb-file sagt, welches die Ausgangssprache für die Übersetzung ist. Im Normalfall nimmt man Englisch als Ausgangssprache.</a:t>
+            </a:r>
+          </a:p>
+          <a:p>
+            <a:r>
+              <a:rPr lang="de-DE" dirty="0"/>
+              <a:t>Output-localization-file gibt den Namen der Dart-Datei an, die erzeugt werden soll. Diese Datei muss später im Code angegeben werden.</a:t>
+            </a:r>
+          </a:p>
+          <a:p>
+            <a:endParaRPr lang="de-DE" dirty="0"/>
+          </a:p>
+          <a:p>
+            <a:r>
+              <a:rPr lang="de-DE" dirty="0"/>
+              <a:t>Den Ordner, den wir angegeben haben, müssen wir naürlich auch anlegen, damit es ihn gibt.</a:t>
+            </a:r>
+          </a:p>
+        </p:txBody>
+      </p:sp>
+      <p:sp>
+        <p:nvSpPr>
+          <p:cNvPr id="4" name="Slide Number Placeholder 3"/>
+          <p:cNvSpPr>
+            <a:spLocks noGrp="1"/>
+          </p:cNvSpPr>
+          <p:nvPr>
+            <p:ph type="sldNum" sz="quarter" idx="5"/>
+          </p:nvPr>
+        </p:nvSpPr>
+        <p:spPr/>
+        <p:txBody>
+          <a:bodyPr/>
+          <a:lstStyle/>
+          <a:p>
+            <a:fld id="{927DBD90-B360-417B-B4B3-F05A4AFC1996}" type="slidenum">
+              <a:rPr lang="de-DE" smtClean="0"/>
+              <a:pPr/>
+              <a:t>6</a:t>
+            </a:fld>
+            <a:endParaRPr lang="de-DE"/>
+          </a:p>
+        </p:txBody>
+      </p:sp>
+    </p:spTree>
+    <p:extLst>
+      <p:ext uri="{BB962C8B-B14F-4D97-AF65-F5344CB8AC3E}">
+        <p14:creationId xmlns:p14="http://schemas.microsoft.com/office/powerpoint/2010/main" val="1397586074"/>
+      </p:ext>
+    </p:extLst>
+  </p:cSld>
+  <p:clrMapOvr>
+    <a:masterClrMapping/>
+  </p:clrMapOvr>
+</p:notes>
+</file>
+
+<file path=ppt/notesSlides/notesSlide4.xml><?xml version="1.0" encoding="utf-8"?>
+<p:notes xmlns:a="http://schemas.openxmlformats.org/drawingml/2006/main" xmlns:r="http://schemas.openxmlformats.org/officeDocument/2006/relationships" xmlns:p="http://schemas.openxmlformats.org/presentationml/2006/main">
+  <p:cSld>
+    <p:spTree>
+      <p:nvGrpSpPr>
+        <p:cNvPr id="1" name=""/>
+        <p:cNvGrpSpPr/>
+        <p:nvPr/>
+      </p:nvGrpSpPr>
+      <p:grpSpPr>
+        <a:xfrm>
+          <a:off x="0" y="0"/>
+          <a:ext cx="0" cy="0"/>
+          <a:chOff x="0" y="0"/>
+          <a:chExt cx="0" cy="0"/>
+        </a:xfrm>
+      </p:grpSpPr>
+      <p:sp>
+        <p:nvSpPr>
+          <p:cNvPr id="2" name="Slide Image Placeholder 1"/>
+          <p:cNvSpPr>
+            <a:spLocks noGrp="1" noRot="1" noChangeAspect="1"/>
+          </p:cNvSpPr>
+          <p:nvPr>
+            <p:ph type="sldImg"/>
+          </p:nvPr>
+        </p:nvSpPr>
+        <p:spPr>
+          <a:xfrm>
+            <a:off x="685800" y="1143000"/>
+            <a:ext cx="4270375" cy="2401888"/>
+          </a:xfrm>
+        </p:spPr>
+      </p:sp>
+      <p:sp>
+        <p:nvSpPr>
+          <p:cNvPr id="3" name="Notes Placeholder 2"/>
+          <p:cNvSpPr>
+            <a:spLocks noGrp="1"/>
+          </p:cNvSpPr>
+          <p:nvPr>
+            <p:ph type="body" idx="1"/>
+          </p:nvPr>
+        </p:nvSpPr>
+        <p:spPr/>
+        <p:txBody>
+          <a:bodyPr/>
+          <a:lstStyle/>
+          <a:p>
+            <a:r>
+              <a:rPr lang="de-DE" dirty="0"/>
+              <a:t>Die Namen (lila) wie "buttonDelete" müssen gültige Variablennamen sein, da aus diesen später tatsächliche Eigenschaften von Objekten generiert werden.</a:t>
+            </a:r>
+          </a:p>
+          <a:p>
+            <a:r>
+              <a:rPr lang="de-DE" dirty="0"/>
+              <a:t>Die Namen (lila) müssen in der deutschen Version mit denen der englischen Version übereinstimmen und dürfen nicht übersetzt werden.</a:t>
+            </a:r>
+          </a:p>
+          <a:p>
+            <a:endParaRPr lang="de-DE" dirty="0"/>
+          </a:p>
+          <a:p>
+            <a:r>
+              <a:rPr lang="de-DE" dirty="0"/>
+              <a:t>In der Hauptdatei kann man noch Übersetzungshinweise angeben. Dazu legt man den gleichen Eintrag nochmal mit @ an.</a:t>
+            </a:r>
+          </a:p>
+          <a:p>
+            <a:r>
+              <a:rPr lang="de-DE" dirty="0"/>
+              <a:t>Das ist gut, falls man mehrere ähnliche Begriffe hat und der Übersetzer Kontextinformationen braucht, um zu entscheiden, in welchem Umfeld ein Begriff verwendet wird.</a:t>
+            </a:r>
+          </a:p>
+          <a:p>
+            <a:r>
+              <a:rPr lang="de-DE" dirty="0"/>
+              <a:t>Beispiel: exit = Ausgang oder exit = Beenden. </a:t>
+            </a:r>
+          </a:p>
+          <a:p>
+            <a:r>
+              <a:rPr lang="de-DE" dirty="0"/>
+              <a:t>Die Beschreibung könnte dann sagen "Exit of the house" oder "Ends the application".</a:t>
+            </a:r>
+          </a:p>
+        </p:txBody>
+      </p:sp>
+      <p:sp>
+        <p:nvSpPr>
+          <p:cNvPr id="4" name="Slide Number Placeholder 3"/>
+          <p:cNvSpPr>
+            <a:spLocks noGrp="1"/>
+          </p:cNvSpPr>
+          <p:nvPr>
+            <p:ph type="sldNum" sz="quarter" idx="5"/>
+          </p:nvPr>
+        </p:nvSpPr>
+        <p:spPr/>
+        <p:txBody>
+          <a:bodyPr/>
+          <a:lstStyle/>
+          <a:p>
+            <a:fld id="{927DBD90-B360-417B-B4B3-F05A4AFC1996}" type="slidenum">
+              <a:rPr lang="de-DE" smtClean="0"/>
+              <a:pPr/>
+              <a:t>7</a:t>
+            </a:fld>
+            <a:endParaRPr lang="de-DE"/>
+          </a:p>
+        </p:txBody>
+      </p:sp>
+    </p:spTree>
+    <p:extLst>
+      <p:ext uri="{BB962C8B-B14F-4D97-AF65-F5344CB8AC3E}">
+        <p14:creationId xmlns:p14="http://schemas.microsoft.com/office/powerpoint/2010/main" val="1936885575"/>
+      </p:ext>
+    </p:extLst>
+  </p:cSld>
+  <p:clrMapOvr>
+    <a:masterClrMapping/>
+  </p:clrMapOvr>
+</p:notes>
+</file>
+
+<file path=ppt/notesSlides/notesSlide5.xml><?xml version="1.0" encoding="utf-8"?>
+<p:notes xmlns:a="http://schemas.openxmlformats.org/drawingml/2006/main" xmlns:r="http://schemas.openxmlformats.org/officeDocument/2006/relationships" xmlns:p="http://schemas.openxmlformats.org/presentationml/2006/main">
+  <p:cSld>
+    <p:spTree>
+      <p:nvGrpSpPr>
+        <p:cNvPr id="1" name=""/>
+        <p:cNvGrpSpPr/>
+        <p:nvPr/>
+      </p:nvGrpSpPr>
+      <p:grpSpPr>
+        <a:xfrm>
+          <a:off x="0" y="0"/>
+          <a:ext cx="0" cy="0"/>
+          <a:chOff x="0" y="0"/>
+          <a:chExt cx="0" cy="0"/>
+        </a:xfrm>
+      </p:grpSpPr>
+      <p:sp>
+        <p:nvSpPr>
+          <p:cNvPr id="2" name="Slide Image Placeholder 1"/>
+          <p:cNvSpPr>
+            <a:spLocks noGrp="1" noRot="1" noChangeAspect="1"/>
+          </p:cNvSpPr>
+          <p:nvPr>
+            <p:ph type="sldImg"/>
+          </p:nvPr>
+        </p:nvSpPr>
+        <p:spPr>
+          <a:xfrm>
+            <a:off x="685800" y="1143000"/>
+            <a:ext cx="4270375" cy="2401888"/>
+          </a:xfrm>
+        </p:spPr>
+      </p:sp>
+      <p:sp>
+        <p:nvSpPr>
+          <p:cNvPr id="3" name="Notes Placeholder 2"/>
+          <p:cNvSpPr>
+            <a:spLocks noGrp="1"/>
+          </p:cNvSpPr>
+          <p:nvPr>
+            <p:ph type="body" idx="1"/>
+          </p:nvPr>
+        </p:nvSpPr>
+        <p:spPr/>
+        <p:txBody>
+          <a:bodyPr/>
+          <a:lstStyle/>
+          <a:p>
+            <a:r>
+              <a:rPr lang="de-DE" dirty="0"/>
+              <a:t>Damit die App weiß, welche Sprachen es gibt, muss man die Daten dort verknüpfen.</a:t>
+            </a:r>
+          </a:p>
+        </p:txBody>
+      </p:sp>
+      <p:sp>
+        <p:nvSpPr>
+          <p:cNvPr id="4" name="Slide Number Placeholder 3"/>
+          <p:cNvSpPr>
+            <a:spLocks noGrp="1"/>
+          </p:cNvSpPr>
+          <p:nvPr>
+            <p:ph type="sldNum" sz="quarter" idx="5"/>
+          </p:nvPr>
+        </p:nvSpPr>
+        <p:spPr/>
+        <p:txBody>
+          <a:bodyPr/>
+          <a:lstStyle/>
+          <a:p>
+            <a:fld id="{927DBD90-B360-417B-B4B3-F05A4AFC1996}" type="slidenum">
+              <a:rPr lang="de-DE" smtClean="0"/>
+              <a:pPr/>
+              <a:t>8</a:t>
+            </a:fld>
+            <a:endParaRPr lang="de-DE"/>
+          </a:p>
+        </p:txBody>
+      </p:sp>
+    </p:spTree>
+    <p:extLst>
+      <p:ext uri="{BB962C8B-B14F-4D97-AF65-F5344CB8AC3E}">
+        <p14:creationId xmlns:p14="http://schemas.microsoft.com/office/powerpoint/2010/main" val="685854397"/>
+      </p:ext>
+    </p:extLst>
+  </p:cSld>
+  <p:clrMapOvr>
+    <a:masterClrMapping/>
+  </p:clrMapOvr>
+</p:notes>
+</file>
+
+<file path=ppt/notesSlides/notesSlide6.xml><?xml version="1.0" encoding="utf-8"?>
+<p:notes xmlns:a="http://schemas.openxmlformats.org/drawingml/2006/main" xmlns:r="http://schemas.openxmlformats.org/officeDocument/2006/relationships" xmlns:p="http://schemas.openxmlformats.org/presentationml/2006/main">
+  <p:cSld>
+    <p:spTree>
+      <p:nvGrpSpPr>
+        <p:cNvPr id="1" name=""/>
+        <p:cNvGrpSpPr/>
+        <p:nvPr/>
+      </p:nvGrpSpPr>
+      <p:grpSpPr>
+        <a:xfrm>
+          <a:off x="0" y="0"/>
+          <a:ext cx="0" cy="0"/>
+          <a:chOff x="0" y="0"/>
+          <a:chExt cx="0" cy="0"/>
+        </a:xfrm>
+      </p:grpSpPr>
+      <p:sp>
+        <p:nvSpPr>
+          <p:cNvPr id="2" name="Slide Image Placeholder 1"/>
+          <p:cNvSpPr>
+            <a:spLocks noGrp="1" noRot="1" noChangeAspect="1"/>
+          </p:cNvSpPr>
+          <p:nvPr>
+            <p:ph type="sldImg"/>
+          </p:nvPr>
+        </p:nvSpPr>
+        <p:spPr>
+          <a:xfrm>
+            <a:off x="685800" y="1143000"/>
+            <a:ext cx="4270375" cy="2401888"/>
+          </a:xfrm>
+        </p:spPr>
+      </p:sp>
+      <p:sp>
+        <p:nvSpPr>
+          <p:cNvPr id="3" name="Notes Placeholder 2"/>
+          <p:cNvSpPr>
+            <a:spLocks noGrp="1"/>
+          </p:cNvSpPr>
+          <p:nvPr>
+            <p:ph type="body" idx="1"/>
+          </p:nvPr>
+        </p:nvSpPr>
+        <p:spPr/>
+        <p:txBody>
+          <a:bodyPr/>
+          <a:lstStyle/>
+          <a:p>
+            <a:r>
+              <a:rPr lang="de-DE" dirty="0"/>
+              <a:t>In den einzelnen Widgets muss die generierte Datei auch importiert werden.</a:t>
+            </a:r>
+          </a:p>
+          <a:p>
+            <a:r>
+              <a:rPr lang="de-DE" dirty="0"/>
+              <a:t>Überall wo man vorher Strings in Anführungszeichen hatte, benutzt man jetzt eine Variable aus der Applocalization Klasse.</a:t>
+            </a:r>
+          </a:p>
+        </p:txBody>
+      </p:sp>
+      <p:sp>
+        <p:nvSpPr>
+          <p:cNvPr id="4" name="Slide Number Placeholder 3"/>
+          <p:cNvSpPr>
+            <a:spLocks noGrp="1"/>
+          </p:cNvSpPr>
+          <p:nvPr>
+            <p:ph type="sldNum" sz="quarter" idx="5"/>
+          </p:nvPr>
+        </p:nvSpPr>
+        <p:spPr/>
+        <p:txBody>
+          <a:bodyPr/>
+          <a:lstStyle/>
+          <a:p>
+            <a:fld id="{927DBD90-B360-417B-B4B3-F05A4AFC1996}" type="slidenum">
+              <a:rPr lang="de-DE" smtClean="0"/>
+              <a:pPr/>
+              <a:t>9</a:t>
+            </a:fld>
+            <a:endParaRPr lang="de-DE"/>
+          </a:p>
+        </p:txBody>
+      </p:sp>
+    </p:spTree>
+    <p:extLst>
+      <p:ext uri="{BB962C8B-B14F-4D97-AF65-F5344CB8AC3E}">
+        <p14:creationId xmlns:p14="http://schemas.microsoft.com/office/powerpoint/2010/main" val="619501720"/>
+      </p:ext>
+    </p:extLst>
+  </p:cSld>
+  <p:clrMapOvr>
+    <a:masterClrMapping/>
+  </p:clrMapOvr>
+</p:notes>
+</file>
+
+<file path=ppt/notesSlides/notesSlide7.xml><?xml version="1.0" encoding="utf-8"?>
+<p:notes xmlns:a="http://schemas.openxmlformats.org/drawingml/2006/main" xmlns:r="http://schemas.openxmlformats.org/officeDocument/2006/relationships" xmlns:p="http://schemas.openxmlformats.org/presentationml/2006/main">
+  <p:cSld>
+    <p:spTree>
+      <p:nvGrpSpPr>
+        <p:cNvPr id="1" name=""/>
+        <p:cNvGrpSpPr/>
+        <p:nvPr/>
+      </p:nvGrpSpPr>
+      <p:grpSpPr>
+        <a:xfrm>
+          <a:off x="0" y="0"/>
+          <a:ext cx="0" cy="0"/>
+          <a:chOff x="0" y="0"/>
+          <a:chExt cx="0" cy="0"/>
+        </a:xfrm>
+      </p:grpSpPr>
+      <p:sp>
+        <p:nvSpPr>
+          <p:cNvPr id="2" name="Folienbildplatzhalter 1"/>
+          <p:cNvSpPr>
+            <a:spLocks noGrp="1" noRot="1" noChangeAspect="1"/>
+          </p:cNvSpPr>
+          <p:nvPr>
+            <p:ph type="sldImg"/>
+          </p:nvPr>
+        </p:nvSpPr>
+        <p:spPr>
+          <a:xfrm>
+            <a:off x="685800" y="1143000"/>
+            <a:ext cx="4270375" cy="2401888"/>
+          </a:xfrm>
+        </p:spPr>
+      </p:sp>
+      <p:sp>
+        <p:nvSpPr>
+          <p:cNvPr id="3" name="Notizenplatzhalter 2"/>
+          <p:cNvSpPr>
+            <a:spLocks noGrp="1"/>
+          </p:cNvSpPr>
+          <p:nvPr>
+            <p:ph type="body" idx="1"/>
+          </p:nvPr>
+        </p:nvSpPr>
+        <p:spPr/>
+        <p:txBody>
+          <a:bodyPr/>
+          <a:lstStyle/>
+          <a:p>
+            <a:endParaRPr lang="de-DE"/>
+          </a:p>
+        </p:txBody>
+      </p:sp>
+      <p:sp>
+        <p:nvSpPr>
+          <p:cNvPr id="4" name="Foliennummernplatzhalter 3"/>
+          <p:cNvSpPr>
+            <a:spLocks noGrp="1"/>
+          </p:cNvSpPr>
+          <p:nvPr>
+            <p:ph type="sldNum" sz="quarter" idx="10"/>
+          </p:nvPr>
+        </p:nvSpPr>
+        <p:spPr/>
+        <p:txBody>
+          <a:bodyPr/>
+          <a:lstStyle/>
+          <a:p>
+            <a:fld id="{927DBD90-B360-417B-B4B3-F05A4AFC1996}" type="slidenum">
+              <a:rPr lang="de-DE" smtClean="0"/>
+              <a:t>12</a:t>
             </a:fld>
             <a:endParaRPr lang="de-DE"/>
           </a:p>
@@ -1374,7 +1919,7 @@
           <a:p>
             <a:fld id="{A4DA86CE-A57A-427D-B997-E876264AFCED}" type="datetime1">
               <a:rPr lang="de-DE" smtClean="0"/>
-              <a:t>07.04.2022</a:t>
+              <a:t>01.06.2023</a:t>
             </a:fld>
             <a:endParaRPr lang="de-DE"/>
           </a:p>
@@ -1419,7 +1964,7 @@
           <a:p>
             <a:fld id="{3A1F27E2-D58A-4028-9FF2-B12D897F257E}" type="slidenum">
               <a:rPr lang="de-DE" smtClean="0"/>
-              <a:t>‹Nr.›</a:t>
+              <a:t>‹#›</a:t>
             </a:fld>
             <a:endParaRPr lang="de-DE"/>
           </a:p>
@@ -1579,7 +2124,7 @@
           <a:p>
             <a:fld id="{01D93119-B7C5-47AA-850D-27E79467F1B8}" type="datetime1">
               <a:rPr lang="de-DE" smtClean="0"/>
-              <a:t>07.04.2022</a:t>
+              <a:t>01.06.2023</a:t>
             </a:fld>
             <a:endParaRPr lang="de-DE"/>
           </a:p>
@@ -1624,7 +2169,7 @@
           <a:p>
             <a:fld id="{3A1F27E2-D58A-4028-9FF2-B12D897F257E}" type="slidenum">
               <a:rPr lang="de-DE" smtClean="0"/>
-              <a:t>‹Nr.›</a:t>
+              <a:t>‹#›</a:t>
             </a:fld>
             <a:endParaRPr lang="de-DE"/>
           </a:p>
@@ -1733,7 +2278,7 @@
           <a:p>
             <a:fld id="{D1723D4D-56B2-460B-953A-8141A2B40444}" type="datetime1">
               <a:rPr lang="de-DE" smtClean="0"/>
-              <a:t>07.04.2022</a:t>
+              <a:t>01.06.2023</a:t>
             </a:fld>
             <a:endParaRPr lang="de-DE"/>
           </a:p>
@@ -1778,7 +2323,7 @@
           <a:p>
             <a:fld id="{3A1F27E2-D58A-4028-9FF2-B12D897F257E}" type="slidenum">
               <a:rPr lang="de-DE" smtClean="0"/>
-              <a:t>‹Nr.›</a:t>
+              <a:t>‹#›</a:t>
             </a:fld>
             <a:endParaRPr lang="de-DE"/>
           </a:p>
@@ -1970,7 +2515,7 @@
           <a:p>
             <a:fld id="{8819B76C-2FFB-4EBE-9844-F161FB318587}" type="datetime1">
               <a:rPr lang="de-DE" smtClean="0"/>
-              <a:t>07.04.2022</a:t>
+              <a:t>01.06.2023</a:t>
             </a:fld>
             <a:endParaRPr lang="de-DE"/>
           </a:p>
@@ -2015,7 +2560,7 @@
           <a:p>
             <a:fld id="{3A1F27E2-D58A-4028-9FF2-B12D897F257E}" type="slidenum">
               <a:rPr lang="de-DE" smtClean="0"/>
-              <a:t>‹Nr.›</a:t>
+              <a:t>‹#›</a:t>
             </a:fld>
             <a:endParaRPr lang="de-DE"/>
           </a:p>
@@ -2146,7 +2691,7 @@
           <a:p>
             <a:fld id="{C312227E-C521-4FD0-AB53-4510B2685A9C}" type="datetime1">
               <a:rPr lang="de-DE" smtClean="0"/>
-              <a:t>07.04.2022</a:t>
+              <a:t>01.06.2023</a:t>
             </a:fld>
             <a:endParaRPr lang="de-DE"/>
           </a:p>
@@ -2191,7 +2736,7 @@
           <a:p>
             <a:fld id="{3A1F27E2-D58A-4028-9FF2-B12D897F257E}" type="slidenum">
               <a:rPr lang="de-DE" smtClean="0"/>
-              <a:t>‹Nr.›</a:t>
+              <a:t>‹#›</a:t>
             </a:fld>
             <a:endParaRPr lang="de-DE"/>
           </a:p>
@@ -2322,7 +2867,7 @@
           <a:p>
             <a:fld id="{ACF81D18-93A5-4696-A4BC-99054C39432C}" type="datetime1">
               <a:rPr lang="de-DE" smtClean="0"/>
-              <a:t>07.04.2022</a:t>
+              <a:t>01.06.2023</a:t>
             </a:fld>
             <a:endParaRPr lang="de-DE"/>
           </a:p>
@@ -2367,7 +2912,7 @@
           <a:p>
             <a:fld id="{3A1F27E2-D58A-4028-9FF2-B12D897F257E}" type="slidenum">
               <a:rPr lang="de-DE" smtClean="0"/>
-              <a:t>‹Nr.›</a:t>
+              <a:t>‹#›</a:t>
             </a:fld>
             <a:endParaRPr lang="de-DE"/>
           </a:p>
@@ -2472,7 +3017,7 @@
           <a:p>
             <a:fld id="{9F5D4D4F-F473-4631-846E-7D5DD666FFE8}" type="datetime1">
               <a:rPr lang="de-DE" smtClean="0"/>
-              <a:t>07.04.2022</a:t>
+              <a:t>01.06.2023</a:t>
             </a:fld>
             <a:endParaRPr lang="de-DE"/>
           </a:p>
@@ -2517,7 +3062,7 @@
           <a:p>
             <a:fld id="{3A1F27E2-D58A-4028-9FF2-B12D897F257E}" type="slidenum">
               <a:rPr lang="de-DE" smtClean="0"/>
-              <a:t>‹Nr.›</a:t>
+              <a:t>‹#›</a:t>
             </a:fld>
             <a:endParaRPr lang="de-DE"/>
           </a:p>
@@ -2570,7 +3115,7 @@
           <a:p>
             <a:fld id="{782A44AC-E400-492B-96F2-7AA1F643E87C}" type="datetime1">
               <a:rPr lang="de-DE" smtClean="0"/>
-              <a:t>07.04.2022</a:t>
+              <a:t>01.06.2023</a:t>
             </a:fld>
             <a:endParaRPr lang="de-DE"/>
           </a:p>
@@ -2615,7 +3160,7 @@
           <a:p>
             <a:fld id="{3A1F27E2-D58A-4028-9FF2-B12D897F257E}" type="slidenum">
               <a:rPr lang="de-DE" smtClean="0"/>
-              <a:t>‹Nr.›</a:t>
+              <a:t>‹#›</a:t>
             </a:fld>
             <a:endParaRPr lang="de-DE"/>
           </a:p>
@@ -2694,7 +3239,7 @@
           <a:p>
             <a:fld id="{360284C2-5492-4305-A217-C1544709D450}" type="datetime1">
               <a:rPr lang="de-DE" smtClean="0"/>
-              <a:t>07.04.2022</a:t>
+              <a:t>01.06.2023</a:t>
             </a:fld>
             <a:endParaRPr lang="de-DE"/>
           </a:p>
@@ -2739,7 +3284,7 @@
           <a:p>
             <a:fld id="{3A1F27E2-D58A-4028-9FF2-B12D897F257E}" type="slidenum">
               <a:rPr lang="de-DE" smtClean="0"/>
-              <a:t>‹Nr.›</a:t>
+              <a:t>‹#›</a:t>
             </a:fld>
             <a:endParaRPr lang="de-DE"/>
           </a:p>
@@ -2878,7 +3423,7 @@
           <a:p>
             <a:fld id="{C558EF71-C65C-4449-BF0E-A5139472897A}" type="datetime1">
               <a:rPr lang="de-DE" smtClean="0"/>
-              <a:t>07.04.2022</a:t>
+              <a:t>01.06.2023</a:t>
             </a:fld>
             <a:endParaRPr lang="de-DE"/>
           </a:p>
@@ -2923,7 +3468,7 @@
           <a:p>
             <a:fld id="{3A1F27E2-D58A-4028-9FF2-B12D897F257E}" type="slidenum">
               <a:rPr lang="de-DE" smtClean="0"/>
-              <a:t>‹Nr.›</a:t>
+              <a:t>‹#›</a:t>
             </a:fld>
             <a:endParaRPr lang="de-DE"/>
           </a:p>
@@ -3083,7 +3628,7 @@
           <a:p>
             <a:fld id="{7AC6B2A2-11E3-479B-B2DE-3AD53D772513}" type="datetime1">
               <a:rPr lang="de-DE" smtClean="0"/>
-              <a:t>07.04.2022</a:t>
+              <a:t>01.06.2023</a:t>
             </a:fld>
             <a:endParaRPr lang="de-DE"/>
           </a:p>
@@ -3128,7 +3673,7 @@
           <a:p>
             <a:fld id="{3A1F27E2-D58A-4028-9FF2-B12D897F257E}" type="slidenum">
               <a:rPr lang="de-DE" smtClean="0"/>
-              <a:t>‹Nr.›</a:t>
+              <a:t>‹#›</a:t>
             </a:fld>
             <a:endParaRPr lang="de-DE"/>
           </a:p>
@@ -3441,7 +3986,7 @@
           <a:p>
             <a:fld id="{CC67E130-7F38-48C0-9D99-87B3C91C83C9}" type="datetime1">
               <a:rPr lang="de-DE" smtClean="0"/>
-              <a:t>07.04.2022</a:t>
+              <a:t>01.06.2023</a:t>
             </a:fld>
             <a:endParaRPr lang="de-DE" dirty="0"/>
           </a:p>
@@ -3528,7 +4073,7 @@
             <a:fld id="{3A1F27E2-D58A-4028-9FF2-B12D897F257E}" type="slidenum">
               <a:rPr lang="de-DE" smtClean="0"/>
               <a:pPr/>
-              <a:t>‹Nr.›</a:t>
+              <a:t>‹#›</a:t>
             </a:fld>
             <a:endParaRPr lang="de-DE"/>
           </a:p>
@@ -4082,7 +4627,7 @@
           <a:p>
             <a:fld id="{38BE5C5E-85F2-47A9-B39D-E9A2E79BE5FE}" type="datetime1">
               <a:rPr lang="de-DE" smtClean="0"/>
-              <a:t>07.04.2022</a:t>
+              <a:t>01.06.2023</a:t>
             </a:fld>
             <a:endParaRPr lang="de-DE" dirty="0"/>
           </a:p>
@@ -4169,7 +4714,7 @@
             <a:fld id="{3A1F27E2-D58A-4028-9FF2-B12D897F257E}" type="slidenum">
               <a:rPr lang="de-DE" smtClean="0"/>
               <a:pPr/>
-              <a:t>‹Nr.›</a:t>
+              <a:t>‹#›</a:t>
             </a:fld>
             <a:endParaRPr lang="de-DE" dirty="0"/>
           </a:p>
@@ -4753,7 +5298,7 @@
           <a:p>
             <a:fld id="{C7DBCE75-0A72-420E-BE6A-F35B415C0B45}" type="datetime1">
               <a:rPr lang="de-DE" smtClean="0"/>
-              <a:t>07.04.2022</a:t>
+              <a:t>01.06.2023</a:t>
             </a:fld>
             <a:endParaRPr lang="de-DE"/>
           </a:p>
@@ -4836,7 +5381,13 @@
       </p:grpSpPr>
       <p:sp>
         <p:nvSpPr>
-          <p:cNvPr id="4" name="Titel 3"/>
+          <p:cNvPr id="2" name="Titel 1">
+            <a:extLst>
+              <a:ext uri="{FF2B5EF4-FFF2-40B4-BE49-F238E27FC236}">
+                <a16:creationId xmlns:a16="http://schemas.microsoft.com/office/drawing/2014/main" id="{C0CF2D99-787C-40D6-9DC6-05CCCBEF6560}"/>
+              </a:ext>
+            </a:extLst>
+          </p:cNvPr>
           <p:cNvSpPr>
             <a:spLocks noGrp="1"/>
           </p:cNvSpPr>
@@ -4851,14 +5402,20 @@
           <a:p>
             <a:r>
               <a:rPr lang="de-DE" dirty="0"/>
-              <a:t>Zusammenfassung</a:t>
-            </a:r>
-          </a:p>
-        </p:txBody>
-      </p:sp>
-      <p:sp>
-        <p:nvSpPr>
-          <p:cNvPr id="5" name="Inhaltsplatzhalter 4"/>
+              <a:t>L10N für Flutter</a:t>
+            </a:r>
+          </a:p>
+        </p:txBody>
+      </p:sp>
+      <p:sp>
+        <p:nvSpPr>
+          <p:cNvPr id="3" name="Inhaltsplatzhalter 2">
+            <a:extLst>
+              <a:ext uri="{FF2B5EF4-FFF2-40B4-BE49-F238E27FC236}">
+                <a16:creationId xmlns:a16="http://schemas.microsoft.com/office/drawing/2014/main" id="{517A996B-0673-4CF2-84B0-F7ECF054D807}"/>
+              </a:ext>
+            </a:extLst>
+          </p:cNvPr>
           <p:cNvSpPr>
             <a:spLocks noGrp="1"/>
           </p:cNvSpPr>
@@ -4873,37 +5430,35 @@
           <a:p>
             <a:r>
               <a:rPr lang="de-DE" dirty="0"/>
-              <a:t>Flutter unterstützt </a:t>
-            </a:r>
-            <a:r>
-              <a:rPr lang="de-DE" dirty="0" err="1"/>
-              <a:t>Localization</a:t>
-            </a:r>
-            <a:endParaRPr lang="de-DE" dirty="0"/>
-          </a:p>
-          <a:p>
+              <a:t>Siehe auch</a:t>
+            </a:r>
+            <a:endParaRPr lang="de-DE" dirty="0">
+              <a:hlinkClick r:id="rId2"/>
+            </a:endParaRPr>
+          </a:p>
+          <a:p>
+            <a:r>
+              <a:rPr lang="de-DE" dirty="0">
+                <a:hlinkClick r:id="rId2"/>
+              </a:rPr>
+              <a:t>https://flutter.dev/docs/development/accessibility-and-localization/internationalization</a:t>
+            </a:r>
             <a:r>
               <a:rPr lang="de-DE" dirty="0"/>
-              <a:t>Strings werden in mehreren Dateien abgespeichert</a:t>
-            </a:r>
-          </a:p>
-          <a:p>
-            <a:r>
-              <a:rPr lang="de-DE" dirty="0"/>
-              <a:t>Zur Laufzeit wird der Text entsprechend der Sprache ausgewählt</a:t>
-            </a:r>
-          </a:p>
-          <a:p>
-            <a:r>
-              <a:rPr lang="de-DE" dirty="0"/>
-              <a:t>Anpassungen im Code notwendig, damit die Strings aus dem Quelltext entfernt werden</a:t>
-            </a:r>
-          </a:p>
-        </p:txBody>
-      </p:sp>
-      <p:sp>
-        <p:nvSpPr>
-          <p:cNvPr id="2" name="Datumsplatzhalter 1"/>
+              <a:t> </a:t>
+            </a:r>
+          </a:p>
+        </p:txBody>
+      </p:sp>
+      <p:sp>
+        <p:nvSpPr>
+          <p:cNvPr id="4" name="Datumsplatzhalter 3">
+            <a:extLst>
+              <a:ext uri="{FF2B5EF4-FFF2-40B4-BE49-F238E27FC236}">
+                <a16:creationId xmlns:a16="http://schemas.microsoft.com/office/drawing/2014/main" id="{DB043680-4CB8-4F84-98DE-F832AA091BA0}"/>
+              </a:ext>
+            </a:extLst>
+          </p:cNvPr>
           <p:cNvSpPr>
             <a:spLocks noGrp="1"/>
           </p:cNvSpPr>
@@ -4916,9 +5471,9 @@
           <a:bodyPr/>
           <a:lstStyle/>
           <a:p>
-            <a:fld id="{47273618-0DB4-4FD3-9829-7621FDC83179}" type="datetime1">
+            <a:fld id="{C312227E-C521-4FD0-AB53-4510B2685A9C}" type="datetime1">
               <a:rPr lang="de-DE" smtClean="0"/>
-              <a:t>07.04.2022</a:t>
+              <a:t>01.06.2023</a:t>
             </a:fld>
             <a:endParaRPr lang="de-DE"/>
           </a:p>
@@ -4926,7 +5481,13 @@
       </p:sp>
       <p:sp>
         <p:nvSpPr>
-          <p:cNvPr id="3" name="Fußzeilenplatzhalter 2"/>
+          <p:cNvPr id="5" name="Fußzeilenplatzhalter 4">
+            <a:extLst>
+              <a:ext uri="{FF2B5EF4-FFF2-40B4-BE49-F238E27FC236}">
+                <a16:creationId xmlns:a16="http://schemas.microsoft.com/office/drawing/2014/main" id="{6788967F-8170-4FF2-98B5-823C6FC3453E}"/>
+              </a:ext>
+            </a:extLst>
+          </p:cNvPr>
           <p:cNvSpPr>
             <a:spLocks noGrp="1"/>
           </p:cNvSpPr>
@@ -4948,7 +5509,13 @@
       </p:sp>
       <p:sp>
         <p:nvSpPr>
-          <p:cNvPr id="6" name="Foliennummernplatzhalter 5"/>
+          <p:cNvPr id="6" name="Foliennummernplatzhalter 5">
+            <a:extLst>
+              <a:ext uri="{FF2B5EF4-FFF2-40B4-BE49-F238E27FC236}">
+                <a16:creationId xmlns:a16="http://schemas.microsoft.com/office/drawing/2014/main" id="{A10E42E8-5647-4DAE-B9CB-A6BB7731445B}"/>
+              </a:ext>
+            </a:extLst>
+          </p:cNvPr>
           <p:cNvSpPr>
             <a:spLocks noGrp="1"/>
           </p:cNvSpPr>
@@ -4972,7 +5539,7 @@
     </p:spTree>
     <p:extLst>
       <p:ext uri="{BB962C8B-B14F-4D97-AF65-F5344CB8AC3E}">
-        <p14:creationId xmlns:p14="http://schemas.microsoft.com/office/powerpoint/2010/main" val="2637983416"/>
+        <p14:creationId xmlns:p14="http://schemas.microsoft.com/office/powerpoint/2010/main" val="1090781285"/>
       </p:ext>
     </p:extLst>
   </p:cSld>
@@ -5016,7 +5583,52 @@
           <a:p>
             <a:r>
               <a:rPr lang="de-DE" dirty="0"/>
-              <a:t>Fragen</a:t>
+              <a:t>Zusammenfassung</a:t>
+            </a:r>
+          </a:p>
+        </p:txBody>
+      </p:sp>
+      <p:sp>
+        <p:nvSpPr>
+          <p:cNvPr id="5" name="Inhaltsplatzhalter 4"/>
+          <p:cNvSpPr>
+            <a:spLocks noGrp="1"/>
+          </p:cNvSpPr>
+          <p:nvPr>
+            <p:ph idx="1"/>
+          </p:nvPr>
+        </p:nvSpPr>
+        <p:spPr/>
+        <p:txBody>
+          <a:bodyPr/>
+          <a:lstStyle/>
+          <a:p>
+            <a:r>
+              <a:rPr lang="de-DE" dirty="0"/>
+              <a:t>Flutter unterstützt </a:t>
+            </a:r>
+            <a:r>
+              <a:rPr lang="de-DE" dirty="0" err="1"/>
+              <a:t>Localization</a:t>
+            </a:r>
+            <a:endParaRPr lang="de-DE" dirty="0"/>
+          </a:p>
+          <a:p>
+            <a:r>
+              <a:rPr lang="de-DE" dirty="0"/>
+              <a:t>Strings werden in mehreren Dateien abgespeichert</a:t>
+            </a:r>
+          </a:p>
+          <a:p>
+            <a:r>
+              <a:rPr lang="de-DE" dirty="0"/>
+              <a:t>Zur Laufzeit wird der Text entsprechend der Sprache ausgewählt</a:t>
+            </a:r>
+          </a:p>
+          <a:p>
+            <a:r>
+              <a:rPr lang="de-DE" dirty="0"/>
+              <a:t>Anpassungen im Code notwendig, damit die Strings aus dem Quelltext entfernt werden</a:t>
             </a:r>
           </a:p>
         </p:txBody>
@@ -5036,9 +5648,9 @@
           <a:bodyPr/>
           <a:lstStyle/>
           <a:p>
-            <a:fld id="{1855BB4D-036C-4CA9-B9D4-EC82F5F195AA}" type="datetime1">
+            <a:fld id="{47273618-0DB4-4FD3-9829-7621FDC83179}" type="datetime1">
               <a:rPr lang="de-DE" smtClean="0"/>
-              <a:t>07.04.2022</a:t>
+              <a:t>01.06.2023</a:t>
             </a:fld>
             <a:endParaRPr lang="de-DE"/>
           </a:p>
@@ -5084,6 +5696,126 @@
             <a:fld id="{3A1F27E2-D58A-4028-9FF2-B12D897F257E}" type="slidenum">
               <a:rPr lang="de-DE" smtClean="0"/>
               <a:t>11</a:t>
+            </a:fld>
+            <a:endParaRPr lang="de-DE"/>
+          </a:p>
+        </p:txBody>
+      </p:sp>
+    </p:spTree>
+    <p:extLst>
+      <p:ext uri="{BB962C8B-B14F-4D97-AF65-F5344CB8AC3E}">
+        <p14:creationId xmlns:p14="http://schemas.microsoft.com/office/powerpoint/2010/main" val="2637983416"/>
+      </p:ext>
+    </p:extLst>
+  </p:cSld>
+  <p:clrMapOvr>
+    <a:masterClrMapping/>
+  </p:clrMapOvr>
+</p:sld>
+</file>
+
+<file path=ppt/slides/slide12.xml><?xml version="1.0" encoding="utf-8"?>
+<p:sld xmlns:a="http://schemas.openxmlformats.org/drawingml/2006/main" xmlns:r="http://schemas.openxmlformats.org/officeDocument/2006/relationships" xmlns:p="http://schemas.openxmlformats.org/presentationml/2006/main">
+  <p:cSld>
+    <p:spTree>
+      <p:nvGrpSpPr>
+        <p:cNvPr id="1" name=""/>
+        <p:cNvGrpSpPr/>
+        <p:nvPr/>
+      </p:nvGrpSpPr>
+      <p:grpSpPr>
+        <a:xfrm>
+          <a:off x="0" y="0"/>
+          <a:ext cx="0" cy="0"/>
+          <a:chOff x="0" y="0"/>
+          <a:chExt cx="0" cy="0"/>
+        </a:xfrm>
+      </p:grpSpPr>
+      <p:sp>
+        <p:nvSpPr>
+          <p:cNvPr id="4" name="Titel 3"/>
+          <p:cNvSpPr>
+            <a:spLocks noGrp="1"/>
+          </p:cNvSpPr>
+          <p:nvPr>
+            <p:ph type="title"/>
+          </p:nvPr>
+        </p:nvSpPr>
+        <p:spPr/>
+        <p:txBody>
+          <a:bodyPr/>
+          <a:lstStyle/>
+          <a:p>
+            <a:r>
+              <a:rPr lang="de-DE" dirty="0"/>
+              <a:t>Fragen</a:t>
+            </a:r>
+          </a:p>
+        </p:txBody>
+      </p:sp>
+      <p:sp>
+        <p:nvSpPr>
+          <p:cNvPr id="2" name="Datumsplatzhalter 1"/>
+          <p:cNvSpPr>
+            <a:spLocks noGrp="1"/>
+          </p:cNvSpPr>
+          <p:nvPr>
+            <p:ph type="dt" sz="half" idx="10"/>
+          </p:nvPr>
+        </p:nvSpPr>
+        <p:spPr/>
+        <p:txBody>
+          <a:bodyPr/>
+          <a:lstStyle/>
+          <a:p>
+            <a:fld id="{1855BB4D-036C-4CA9-B9D4-EC82F5F195AA}" type="datetime1">
+              <a:rPr lang="de-DE" smtClean="0"/>
+              <a:t>01.06.2023</a:t>
+            </a:fld>
+            <a:endParaRPr lang="de-DE"/>
+          </a:p>
+        </p:txBody>
+      </p:sp>
+      <p:sp>
+        <p:nvSpPr>
+          <p:cNvPr id="3" name="Fußzeilenplatzhalter 2"/>
+          <p:cNvSpPr>
+            <a:spLocks noGrp="1"/>
+          </p:cNvSpPr>
+          <p:nvPr>
+            <p:ph type="ftr" sz="quarter" idx="11"/>
+          </p:nvPr>
+        </p:nvSpPr>
+        <p:spPr/>
+        <p:txBody>
+          <a:bodyPr/>
+          <a:lstStyle/>
+          <a:p>
+            <a:r>
+              <a:rPr lang="de-DE"/>
+              <a:t>Flutter - Globalisierung</a:t>
+            </a:r>
+          </a:p>
+        </p:txBody>
+      </p:sp>
+      <p:sp>
+        <p:nvSpPr>
+          <p:cNvPr id="6" name="Foliennummernplatzhalter 5"/>
+          <p:cNvSpPr>
+            <a:spLocks noGrp="1"/>
+          </p:cNvSpPr>
+          <p:nvPr>
+            <p:ph type="sldNum" sz="quarter" idx="12"/>
+          </p:nvPr>
+        </p:nvSpPr>
+        <p:spPr/>
+        <p:txBody>
+          <a:bodyPr/>
+          <a:lstStyle/>
+          <a:p>
+            <a:fld id="{3A1F27E2-D58A-4028-9FF2-B12D897F257E}" type="slidenum">
+              <a:rPr lang="de-DE" smtClean="0"/>
+              <a:t>12</a:t>
             </a:fld>
             <a:endParaRPr lang="de-DE"/>
           </a:p>
@@ -5192,7 +5924,7 @@
           <a:p>
             <a:fld id="{904E98D7-F87C-479D-ACFE-F45E4C11D580}" type="datetime1">
               <a:rPr lang="de-DE" smtClean="0"/>
-              <a:t>07.04.2022</a:t>
+              <a:t>01.06.2023</a:t>
             </a:fld>
             <a:endParaRPr lang="de-DE"/>
           </a:p>
@@ -5468,7 +6200,7 @@
           <a:p>
             <a:fld id="{7AC6B2A2-11E3-479B-B2DE-3AD53D772513}" type="datetime1">
               <a:rPr lang="de-DE" smtClean="0"/>
-              <a:t>07.04.2022</a:t>
+              <a:t>01.06.2023</a:t>
             </a:fld>
             <a:endParaRPr lang="de-DE"/>
           </a:p>
@@ -6009,7 +6741,7 @@
           <a:p>
             <a:fld id="{7AC6B2A2-11E3-479B-B2DE-3AD53D772513}" type="datetime1">
               <a:rPr lang="de-DE" smtClean="0"/>
-              <a:t>07.04.2022</a:t>
+              <a:t>01.06.2023</a:t>
             </a:fld>
             <a:endParaRPr lang="de-DE"/>
           </a:p>
@@ -6174,7 +6906,7 @@
               <a:buNone/>
             </a:pPr>
             <a:r>
-              <a:rPr kumimoji="0" lang="de-DE" altLang="de-DE" sz="2000" b="0" i="0" u="none" strike="noStrike" cap="none" normalizeH="0" baseline="0" dirty="0" err="1">
+              <a:rPr kumimoji="0" lang="de-DE" altLang="de-DE" sz="2000" b="0" i="0" u="none" strike="noStrike" cap="none" normalizeH="0" baseline="0" dirty="0">
                 <a:ln>
                   <a:noFill/>
                 </a:ln>
@@ -6229,7 +6961,7 @@
               <a:t>  </a:t>
             </a:r>
             <a:r>
-              <a:rPr kumimoji="0" lang="de-DE" altLang="de-DE" sz="2000" b="0" i="0" u="none" strike="noStrike" cap="none" normalizeH="0" baseline="0" dirty="0" err="1">
+              <a:rPr kumimoji="0" lang="de-DE" altLang="de-DE" sz="2000" b="0" i="0" u="none" strike="noStrike" cap="none" normalizeH="0" baseline="0" dirty="0">
                 <a:ln>
                   <a:noFill/>
                 </a:ln>
@@ -6284,7 +7016,7 @@
               <a:t>    </a:t>
             </a:r>
             <a:r>
-              <a:rPr kumimoji="0" lang="de-DE" altLang="de-DE" sz="2000" b="0" i="0" u="none" strike="noStrike" cap="none" normalizeH="0" baseline="0" dirty="0" err="1">
+              <a:rPr kumimoji="0" lang="de-DE" altLang="de-DE" sz="2000" b="0" i="0" u="none" strike="noStrike" cap="none" normalizeH="0" baseline="0" dirty="0">
                 <a:ln>
                   <a:noFill/>
                 </a:ln>
@@ -6309,21 +7041,7 @@
                 <a:latin typeface="Consolas" panose="020B0609020204030204" pitchFamily="49" charset="0"/>
                 <a:ea typeface="JetBrains Mono"/>
               </a:rPr>
-              <a:t>: </a:t>
-            </a:r>
-            <a:r>
-              <a:rPr kumimoji="0" lang="de-DE" altLang="de-DE" sz="2000" b="0" i="0" u="none" strike="noStrike" cap="none" normalizeH="0" baseline="0" dirty="0" err="1">
-                <a:ln>
-                  <a:noFill/>
-                </a:ln>
-                <a:solidFill>
-                  <a:srgbClr val="1E5600"/>
-                </a:solidFill>
-                <a:effectLst/>
-                <a:latin typeface="Consolas" panose="020B0609020204030204" pitchFamily="49" charset="0"/>
-                <a:ea typeface="JetBrains Mono"/>
-              </a:rPr>
-              <a:t>flutter</a:t>
+              <a:t>: flutter</a:t>
             </a:r>
             <a:br>
               <a:rPr kumimoji="0" lang="de-DE" altLang="de-DE" sz="2000" b="0" i="0" u="none" strike="noStrike" cap="none" normalizeH="0" baseline="0" dirty="0">
@@ -6353,7 +7071,7 @@
               <a:t>  </a:t>
             </a:r>
             <a:r>
-              <a:rPr kumimoji="0" lang="de-DE" altLang="de-DE" sz="2000" b="0" i="0" u="none" strike="noStrike" cap="none" normalizeH="0" baseline="0" dirty="0" err="1">
+              <a:rPr kumimoji="0" lang="de-DE" altLang="de-DE" sz="2000" b="0" i="0" u="none" strike="noStrike" cap="none" normalizeH="0" baseline="0" dirty="0">
                 <a:ln>
                   <a:noFill/>
                 </a:ln>
@@ -6378,7 +7096,7 @@
                 <a:latin typeface="Consolas" panose="020B0609020204030204" pitchFamily="49" charset="0"/>
                 <a:ea typeface="JetBrains Mono"/>
               </a:rPr>
-              <a:t>: ^0.17.0</a:t>
+              <a:t>: ^0.18.0</a:t>
             </a:r>
           </a:p>
           <a:p>
@@ -6402,7 +7120,87 @@
               <a:buNone/>
             </a:pPr>
             <a:r>
-              <a:rPr kumimoji="0" lang="de-DE" altLang="de-DE" sz="2000" b="0" i="0" u="none" strike="noStrike" cap="none" normalizeH="0" baseline="0" dirty="0" err="1">
+              <a:rPr lang="de-DE" altLang="de-DE" sz="2000" dirty="0">
+                <a:solidFill>
+                  <a:srgbClr val="0033B3"/>
+                </a:solidFill>
+                <a:latin typeface="Consolas" panose="020B0609020204030204" pitchFamily="49" charset="0"/>
+              </a:rPr>
+              <a:t>dev_dependencies</a:t>
+            </a:r>
+            <a:r>
+              <a:rPr kumimoji="0" lang="de-DE" altLang="de-DE" sz="2000" b="0" i="0" u="none" strike="noStrike" cap="none" normalizeH="0" baseline="0" dirty="0">
+                <a:ln>
+                  <a:noFill/>
+                </a:ln>
+                <a:effectLst/>
+                <a:latin typeface="Consolas" panose="020B0609020204030204" pitchFamily="49" charset="0"/>
+                <a:ea typeface="JetBrains Mono"/>
+              </a:rPr>
+              <a:t>:</a:t>
+            </a:r>
+          </a:p>
+          <a:p>
+            <a:pPr marL="457200" lvl="1" indent="0">
+              <a:buNone/>
+            </a:pPr>
+            <a:r>
+              <a:rPr kumimoji="0" lang="de-DE" altLang="de-DE" sz="2000" b="0" i="0" u="none" strike="noStrike" cap="none" normalizeH="0" baseline="0" dirty="0">
+                <a:ln>
+                  <a:noFill/>
+                </a:ln>
+                <a:effectLst/>
+                <a:latin typeface="Consolas" panose="020B0609020204030204" pitchFamily="49" charset="0"/>
+                <a:ea typeface="JetBrains Mono"/>
+              </a:rPr>
+              <a:t>  </a:t>
+            </a:r>
+            <a:r>
+              <a:rPr lang="de-DE" altLang="de-DE" sz="2000" dirty="0">
+                <a:solidFill>
+                  <a:srgbClr val="0033B3"/>
+                </a:solidFill>
+                <a:latin typeface="Consolas" panose="020B0609020204030204" pitchFamily="49" charset="0"/>
+              </a:rPr>
+              <a:t>build_runner</a:t>
+            </a:r>
+            <a:r>
+              <a:rPr kumimoji="0" lang="de-DE" altLang="de-DE" sz="2000" b="0" i="0" u="none" strike="noStrike" cap="none" normalizeH="0" baseline="0" dirty="0">
+                <a:ln>
+                  <a:noFill/>
+                </a:ln>
+                <a:effectLst/>
+                <a:latin typeface="Consolas" panose="020B0609020204030204" pitchFamily="49" charset="0"/>
+                <a:ea typeface="JetBrains Mono"/>
+              </a:rPr>
+              <a:t>: ^2.4.4</a:t>
+            </a:r>
+          </a:p>
+          <a:p>
+            <a:pPr marL="457200" lvl="1" indent="0">
+              <a:buNone/>
+            </a:pPr>
+            <a:r>
+              <a:rPr kumimoji="0" lang="de-DE" altLang="de-DE" sz="2000" b="0" i="0" u="none" strike="noStrike" cap="none" normalizeH="0" baseline="0" dirty="0">
+                <a:ln>
+                  <a:noFill/>
+                </a:ln>
+                <a:solidFill>
+                  <a:srgbClr val="0033B3"/>
+                </a:solidFill>
+                <a:effectLst/>
+                <a:latin typeface="Consolas" panose="020B0609020204030204" pitchFamily="49" charset="0"/>
+                <a:ea typeface="JetBrains Mono"/>
+              </a:rPr>
+              <a:t>...</a:t>
+            </a:r>
+          </a:p>
+          <a:p>
+            <a:pPr marL="457200" lvl="1" indent="0">
+              <a:buNone/>
+            </a:pPr>
+            <a:r>
+              <a:rPr kumimoji="0" lang="de-DE" altLang="de-DE" sz="2000" b="0" i="0" u="none" strike="noStrike" cap="none" normalizeH="0" baseline="0" dirty="0">
                 <a:ln>
                   <a:noFill/>
                 </a:ln>
@@ -6457,7 +7255,7 @@
               <a:t>  </a:t>
             </a:r>
             <a:r>
-              <a:rPr kumimoji="0" lang="de-DE" altLang="de-DE" sz="2000" b="0" i="0" u="none" strike="noStrike" cap="none" normalizeH="0" baseline="0" dirty="0" err="1">
+              <a:rPr kumimoji="0" lang="de-DE" altLang="de-DE" sz="2000" b="0" i="0" u="none" strike="noStrike" cap="none" normalizeH="0" baseline="0" dirty="0">
                 <a:ln>
                   <a:noFill/>
                 </a:ln>
@@ -6482,21 +7280,7 @@
                 <a:latin typeface="Consolas" panose="020B0609020204030204" pitchFamily="49" charset="0"/>
                 <a:ea typeface="JetBrains Mono"/>
               </a:rPr>
-              <a:t>: </a:t>
-            </a:r>
-            <a:r>
-              <a:rPr kumimoji="0" lang="de-DE" altLang="de-DE" sz="2000" b="0" i="0" u="none" strike="noStrike" cap="none" normalizeH="0" baseline="0" dirty="0" err="1">
-                <a:ln>
-                  <a:noFill/>
-                </a:ln>
-                <a:solidFill>
-                  <a:srgbClr val="1E5600"/>
-                </a:solidFill>
-                <a:effectLst/>
-                <a:latin typeface="Consolas" panose="020B0609020204030204" pitchFamily="49" charset="0"/>
-                <a:ea typeface="JetBrains Mono"/>
-              </a:rPr>
-              <a:t>true</a:t>
+              <a:t>: true</a:t>
             </a:r>
             <a:endParaRPr kumimoji="0" lang="de-DE" altLang="de-DE" sz="2000" b="0" i="0" u="none" strike="noStrike" cap="none" normalizeH="0" baseline="0" dirty="0">
               <a:ln>
@@ -6571,7 +7355,7 @@
           <a:p>
             <a:fld id="{C312227E-C521-4FD0-AB53-4510B2685A9C}" type="datetime1">
               <a:rPr lang="de-DE" smtClean="0"/>
-              <a:t>07.04.2022</a:t>
+              <a:t>01.06.2023</a:t>
             </a:fld>
             <a:endParaRPr lang="de-DE"/>
           </a:p>
@@ -6728,7 +7512,7 @@
             </a:r>
             <a:r>
               <a:rPr lang="de-DE" dirty="0"/>
-              <a:t>: </a:t>
+              <a:t> im Hauptordner: </a:t>
             </a:r>
           </a:p>
           <a:p>
@@ -7070,7 +7854,7 @@
           <a:p>
             <a:fld id="{C312227E-C521-4FD0-AB53-4510B2685A9C}" type="datetime1">
               <a:rPr lang="de-DE" smtClean="0"/>
-              <a:t>07.04.2022</a:t>
+              <a:t>01.06.2023</a:t>
             </a:fld>
             <a:endParaRPr lang="de-DE"/>
           </a:p>
@@ -8003,7 +8787,7 @@
           <a:p>
             <a:fld id="{C312227E-C521-4FD0-AB53-4510B2685A9C}" type="datetime1">
               <a:rPr lang="de-DE" smtClean="0"/>
-              <a:t>07.04.2022</a:t>
+              <a:t>01.06.2023</a:t>
             </a:fld>
             <a:endParaRPr lang="de-DE"/>
           </a:p>
@@ -8670,214 +9454,6 @@
               <a:latin typeface="Consolas" panose="020B0609020204030204" pitchFamily="49" charset="0"/>
             </a:endParaRPr>
           </a:p>
-          <a:p>
-            <a:r>
-              <a:rPr lang="de-DE" dirty="0"/>
-              <a:t>Anstelle von Strings:</a:t>
-            </a:r>
-          </a:p>
-          <a:p>
-            <a:pPr marL="457200" lvl="1" indent="0">
-              <a:buNone/>
-            </a:pPr>
-            <a:r>
-              <a:rPr kumimoji="0" lang="en-US" altLang="de-DE" sz="2000" b="0" i="0" u="none" strike="noStrike" cap="none" normalizeH="0" baseline="0" dirty="0">
-                <a:ln>
-                  <a:noFill/>
-                </a:ln>
-                <a:solidFill>
-                  <a:srgbClr val="2196F3"/>
-                </a:solidFill>
-                <a:effectLst/>
-                <a:latin typeface="Consolas" panose="020B0609020204030204" pitchFamily="49" charset="0"/>
-                <a:ea typeface="Times New Roman" panose="02020603050405020304" pitchFamily="18" charset="0"/>
-                <a:cs typeface="Courier New" panose="02070309020205020404" pitchFamily="49" charset="0"/>
-              </a:rPr>
-              <a:t>Text</a:t>
-            </a:r>
-            <a:r>
-              <a:rPr kumimoji="0" lang="en-US" altLang="de-DE" sz="2000" b="0" i="0" u="none" strike="noStrike" cap="none" normalizeH="0" baseline="0" dirty="0">
-                <a:ln>
-                  <a:noFill/>
-                </a:ln>
-                <a:solidFill>
-                  <a:srgbClr val="1E5600"/>
-                </a:solidFill>
-                <a:effectLst/>
-                <a:latin typeface="Consolas" panose="020B0609020204030204" pitchFamily="49" charset="0"/>
-                <a:ea typeface="Times New Roman" panose="02020603050405020304" pitchFamily="18" charset="0"/>
-                <a:cs typeface="Courier New" panose="02070309020205020404" pitchFamily="49" charset="0"/>
-              </a:rPr>
-              <a:t>(</a:t>
-            </a:r>
-            <a:br>
-              <a:rPr kumimoji="0" lang="en-US" altLang="de-DE" sz="2000" b="0" i="0" u="none" strike="noStrike" cap="none" normalizeH="0" baseline="0" dirty="0">
-                <a:ln>
-                  <a:noFill/>
-                </a:ln>
-                <a:solidFill>
-                  <a:srgbClr val="1E5600"/>
-                </a:solidFill>
-                <a:effectLst/>
-                <a:latin typeface="Consolas" panose="020B0609020204030204" pitchFamily="49" charset="0"/>
-                <a:ea typeface="Times New Roman" panose="02020603050405020304" pitchFamily="18" charset="0"/>
-                <a:cs typeface="Courier New" panose="02070309020205020404" pitchFamily="49" charset="0"/>
-              </a:rPr>
-            </a:br>
-            <a:r>
-              <a:rPr kumimoji="0" lang="en-US" altLang="de-DE" sz="2000" b="0" i="0" u="none" strike="noStrike" cap="none" normalizeH="0" baseline="0" dirty="0">
-                <a:ln>
-                  <a:noFill/>
-                </a:ln>
-                <a:solidFill>
-                  <a:srgbClr val="1E5600"/>
-                </a:solidFill>
-                <a:effectLst/>
-                <a:latin typeface="Consolas" panose="020B0609020204030204" pitchFamily="49" charset="0"/>
-                <a:ea typeface="Times New Roman" panose="02020603050405020304" pitchFamily="18" charset="0"/>
-                <a:cs typeface="Courier New" panose="02070309020205020404" pitchFamily="49" charset="0"/>
-              </a:rPr>
-              <a:t>  </a:t>
-            </a:r>
-            <a:r>
-              <a:rPr kumimoji="0" lang="en-US" altLang="de-DE" sz="2000" b="0" i="0" u="none" strike="noStrike" cap="none" normalizeH="0" baseline="0" dirty="0" err="1">
-                <a:ln>
-                  <a:noFill/>
-                </a:ln>
-                <a:solidFill>
-                  <a:srgbClr val="000000"/>
-                </a:solidFill>
-                <a:effectLst/>
-                <a:latin typeface="Consolas" panose="020B0609020204030204" pitchFamily="49" charset="0"/>
-                <a:ea typeface="Times New Roman" panose="02020603050405020304" pitchFamily="18" charset="0"/>
-                <a:cs typeface="Courier New" panose="02070309020205020404" pitchFamily="49" charset="0"/>
-              </a:rPr>
-              <a:t>AppLocalizations</a:t>
-            </a:r>
-            <a:r>
-              <a:rPr kumimoji="0" lang="en-US" altLang="de-DE" sz="2000" b="0" i="0" u="none" strike="noStrike" cap="none" normalizeH="0" baseline="0" dirty="0" err="1">
-                <a:ln>
-                  <a:noFill/>
-                </a:ln>
-                <a:solidFill>
-                  <a:srgbClr val="1E5600"/>
-                </a:solidFill>
-                <a:effectLst/>
-                <a:latin typeface="Consolas" panose="020B0609020204030204" pitchFamily="49" charset="0"/>
-                <a:ea typeface="Times New Roman" panose="02020603050405020304" pitchFamily="18" charset="0"/>
-                <a:cs typeface="Courier New" panose="02070309020205020404" pitchFamily="49" charset="0"/>
-              </a:rPr>
-              <a:t>.</a:t>
-            </a:r>
-            <a:r>
-              <a:rPr kumimoji="0" lang="en-US" altLang="de-DE" sz="2000" b="0" i="1" u="none" strike="noStrike" cap="none" normalizeH="0" baseline="0" dirty="0" err="1">
-                <a:ln>
-                  <a:noFill/>
-                </a:ln>
-                <a:solidFill>
-                  <a:srgbClr val="00627A"/>
-                </a:solidFill>
-                <a:effectLst/>
-                <a:latin typeface="Consolas" panose="020B0609020204030204" pitchFamily="49" charset="0"/>
-                <a:ea typeface="Times New Roman" panose="02020603050405020304" pitchFamily="18" charset="0"/>
-                <a:cs typeface="Courier New" panose="02070309020205020404" pitchFamily="49" charset="0"/>
-              </a:rPr>
-              <a:t>of</a:t>
-            </a:r>
-            <a:r>
-              <a:rPr kumimoji="0" lang="en-US" altLang="de-DE" sz="2000" b="0" i="0" u="none" strike="noStrike" cap="none" normalizeH="0" baseline="0" dirty="0">
-                <a:ln>
-                  <a:noFill/>
-                </a:ln>
-                <a:solidFill>
-                  <a:srgbClr val="1E5600"/>
-                </a:solidFill>
-                <a:effectLst/>
-                <a:latin typeface="Consolas" panose="020B0609020204030204" pitchFamily="49" charset="0"/>
-                <a:ea typeface="Times New Roman" panose="02020603050405020304" pitchFamily="18" charset="0"/>
-                <a:cs typeface="Courier New" panose="02070309020205020404" pitchFamily="49" charset="0"/>
-              </a:rPr>
-              <a:t>(context)!.</a:t>
-            </a:r>
-            <a:r>
-              <a:rPr kumimoji="0" lang="en-US" altLang="de-DE" sz="2000" b="0" i="0" u="none" strike="noStrike" cap="none" normalizeH="0" baseline="0" dirty="0" err="1">
-                <a:ln>
-                  <a:noFill/>
-                </a:ln>
-                <a:solidFill>
-                  <a:srgbClr val="871094"/>
-                </a:solidFill>
-                <a:effectLst/>
-                <a:latin typeface="Consolas" panose="020B0609020204030204" pitchFamily="49" charset="0"/>
-                <a:ea typeface="Times New Roman" panose="02020603050405020304" pitchFamily="18" charset="0"/>
-                <a:cs typeface="Courier New" panose="02070309020205020404" pitchFamily="49" charset="0"/>
-              </a:rPr>
-              <a:t>buttonDelete</a:t>
-            </a:r>
-            <a:r>
-              <a:rPr kumimoji="0" lang="en-US" altLang="de-DE" sz="2000" b="0" i="0" u="none" strike="noStrike" cap="none" normalizeH="0" baseline="0" dirty="0">
-                <a:ln>
-                  <a:noFill/>
-                </a:ln>
-                <a:solidFill>
-                  <a:srgbClr val="1E5600"/>
-                </a:solidFill>
-                <a:effectLst/>
-                <a:latin typeface="Consolas" panose="020B0609020204030204" pitchFamily="49" charset="0"/>
-                <a:ea typeface="Times New Roman" panose="02020603050405020304" pitchFamily="18" charset="0"/>
-                <a:cs typeface="Courier New" panose="02070309020205020404" pitchFamily="49" charset="0"/>
-              </a:rPr>
-              <a:t>,</a:t>
-            </a:r>
-            <a:br>
-              <a:rPr kumimoji="0" lang="en-US" altLang="de-DE" sz="2000" b="0" i="0" u="none" strike="noStrike" cap="none" normalizeH="0" baseline="0" dirty="0">
-                <a:ln>
-                  <a:noFill/>
-                </a:ln>
-                <a:solidFill>
-                  <a:srgbClr val="1E5600"/>
-                </a:solidFill>
-                <a:effectLst/>
-                <a:latin typeface="Consolas" panose="020B0609020204030204" pitchFamily="49" charset="0"/>
-                <a:ea typeface="Times New Roman" panose="02020603050405020304" pitchFamily="18" charset="0"/>
-                <a:cs typeface="Courier New" panose="02070309020205020404" pitchFamily="49" charset="0"/>
-              </a:rPr>
-            </a:br>
-            <a:r>
-              <a:rPr kumimoji="0" lang="en-US" altLang="de-DE" sz="2000" b="0" i="0" u="none" strike="noStrike" cap="none" normalizeH="0" baseline="0" dirty="0">
-                <a:ln>
-                  <a:noFill/>
-                </a:ln>
-                <a:solidFill>
-                  <a:srgbClr val="1E5600"/>
-                </a:solidFill>
-                <a:effectLst/>
-                <a:latin typeface="Consolas" panose="020B0609020204030204" pitchFamily="49" charset="0"/>
-                <a:ea typeface="Times New Roman" panose="02020603050405020304" pitchFamily="18" charset="0"/>
-                <a:cs typeface="Courier New" panose="02070309020205020404" pitchFamily="49" charset="0"/>
-              </a:rPr>
-              <a:t>),</a:t>
-            </a:r>
-            <a:r>
-              <a:rPr kumimoji="0" lang="de-DE" altLang="de-DE" sz="2000" b="0" i="0" u="none" strike="noStrike" cap="none" normalizeH="0" baseline="0" dirty="0">
-                <a:ln>
-                  <a:noFill/>
-                </a:ln>
-                <a:solidFill>
-                  <a:schemeClr val="tx1"/>
-                </a:solidFill>
-                <a:effectLst/>
-                <a:latin typeface="Consolas" panose="020B0609020204030204" pitchFamily="49" charset="0"/>
-              </a:rPr>
-              <a:t> </a:t>
-            </a:r>
-          </a:p>
-          <a:p>
-            <a:pPr marL="0" indent="0">
-              <a:buNone/>
-            </a:pPr>
-            <a:endParaRPr lang="de-DE" dirty="0"/>
-          </a:p>
         </p:txBody>
       </p:sp>
       <p:sp>
@@ -8903,7 +9479,7 @@
           <a:p>
             <a:fld id="{C312227E-C521-4FD0-AB53-4510B2685A9C}" type="datetime1">
               <a:rPr lang="de-DE" smtClean="0"/>
-              <a:t>07.04.2022</a:t>
+              <a:t>01.06.2023</a:t>
             </a:fld>
             <a:endParaRPr lang="de-DE"/>
           </a:p>
@@ -9001,7 +9577,7 @@
           <p:cNvPr id="2" name="Titel 1">
             <a:extLst>
               <a:ext uri="{FF2B5EF4-FFF2-40B4-BE49-F238E27FC236}">
-                <a16:creationId xmlns:a16="http://schemas.microsoft.com/office/drawing/2014/main" id="{C0CF2D99-787C-40D6-9DC6-05CCCBEF6560}"/>
+                <a16:creationId xmlns:a16="http://schemas.microsoft.com/office/drawing/2014/main" id="{560BD1C9-EEAE-446F-83D9-738B1669D0AD}"/>
               </a:ext>
             </a:extLst>
           </p:cNvPr>
@@ -9029,7 +9605,7 @@
           <p:cNvPr id="3" name="Inhaltsplatzhalter 2">
             <a:extLst>
               <a:ext uri="{FF2B5EF4-FFF2-40B4-BE49-F238E27FC236}">
-                <a16:creationId xmlns:a16="http://schemas.microsoft.com/office/drawing/2014/main" id="{517A996B-0673-4CF2-84B0-F7ECF054D807}"/>
+                <a16:creationId xmlns:a16="http://schemas.microsoft.com/office/drawing/2014/main" id="{C041AD5E-1A51-43E7-AA71-CCB8C3701194}"/>
               </a:ext>
             </a:extLst>
           </p:cNvPr>
@@ -9042,28 +9618,380 @@
         </p:nvSpPr>
         <p:spPr/>
         <p:txBody>
-          <a:bodyPr/>
+          <a:bodyPr>
+            <a:normAutofit/>
+          </a:bodyPr>
           <a:lstStyle/>
           <a:p>
             <a:r>
               <a:rPr lang="de-DE" dirty="0"/>
-              <a:t>Siehe auch</a:t>
-            </a:r>
-            <a:endParaRPr lang="de-DE" dirty="0">
-              <a:hlinkClick r:id="rId2"/>
+              <a:t>Code in den Widgets anstelle von Strings:</a:t>
+            </a:r>
+          </a:p>
+          <a:p>
+            <a:pPr marL="457200" lvl="1" indent="0">
+              <a:lnSpc>
+                <a:spcPct val="107000"/>
+              </a:lnSpc>
+              <a:spcAft>
+                <a:spcPts val="800"/>
+              </a:spcAft>
+              <a:buNone/>
+              <a:tabLst>
+                <a:tab pos="581660" algn="l"/>
+                <a:tab pos="1163320" algn="l"/>
+                <a:tab pos="1744980" algn="l"/>
+                <a:tab pos="2326640" algn="l"/>
+                <a:tab pos="2908300" algn="l"/>
+                <a:tab pos="3489960" algn="l"/>
+                <a:tab pos="4071620" algn="l"/>
+                <a:tab pos="4653280" algn="l"/>
+                <a:tab pos="5234940" algn="l"/>
+                <a:tab pos="5816600" algn="l"/>
+                <a:tab pos="6398260" algn="l"/>
+                <a:tab pos="6979920" algn="l"/>
+                <a:tab pos="7561580" algn="l"/>
+                <a:tab pos="8143240" algn="l"/>
+                <a:tab pos="8724900" algn="l"/>
+                <a:tab pos="9306560" algn="l"/>
+              </a:tabLst>
+            </a:pPr>
+            <a:r>
+              <a:rPr lang="en-US" sz="2000" dirty="0">
+                <a:solidFill>
+                  <a:srgbClr val="0033B3"/>
+                </a:solidFill>
+                <a:effectLst/>
+                <a:latin typeface="Consolas" panose="020B0609020204030204" pitchFamily="49" charset="0"/>
+                <a:ea typeface="Times New Roman" panose="02020603050405020304" pitchFamily="18" charset="0"/>
+                <a:cs typeface="Times New Roman" panose="02020603050405020304" pitchFamily="18" charset="0"/>
+              </a:rPr>
+              <a:t>import </a:t>
+            </a:r>
+            <a:r>
+              <a:rPr lang="en-US" sz="2000" dirty="0">
+                <a:solidFill>
+                  <a:srgbClr val="00A216"/>
+                </a:solidFill>
+                <a:effectLst/>
+                <a:latin typeface="Consolas" panose="020B0609020204030204" pitchFamily="49" charset="0"/>
+                <a:ea typeface="Times New Roman" panose="02020603050405020304" pitchFamily="18" charset="0"/>
+                <a:cs typeface="Times New Roman" panose="02020603050405020304" pitchFamily="18" charset="0"/>
+              </a:rPr>
+              <a:t>'</a:t>
+            </a:r>
+            <a:r>
+              <a:rPr lang="en-US" sz="2000" dirty="0" err="1">
+                <a:solidFill>
+                  <a:srgbClr val="00A216"/>
+                </a:solidFill>
+                <a:effectLst/>
+                <a:latin typeface="Consolas" panose="020B0609020204030204" pitchFamily="49" charset="0"/>
+                <a:ea typeface="Times New Roman" panose="02020603050405020304" pitchFamily="18" charset="0"/>
+                <a:cs typeface="Times New Roman" panose="02020603050405020304" pitchFamily="18" charset="0"/>
+              </a:rPr>
+              <a:t>package:flutter_gen</a:t>
+            </a:r>
+            <a:r>
+              <a:rPr lang="en-US" sz="2000" dirty="0">
+                <a:solidFill>
+                  <a:srgbClr val="00A216"/>
+                </a:solidFill>
+                <a:effectLst/>
+                <a:latin typeface="Consolas" panose="020B0609020204030204" pitchFamily="49" charset="0"/>
+                <a:ea typeface="Times New Roman" panose="02020603050405020304" pitchFamily="18" charset="0"/>
+                <a:cs typeface="Times New Roman" panose="02020603050405020304" pitchFamily="18" charset="0"/>
+              </a:rPr>
+              <a:t>/gen_l10n/</a:t>
+            </a:r>
+            <a:r>
+              <a:rPr lang="en-US" sz="2000" dirty="0" err="1">
+                <a:solidFill>
+                  <a:srgbClr val="00A216"/>
+                </a:solidFill>
+                <a:effectLst/>
+                <a:latin typeface="Consolas" panose="020B0609020204030204" pitchFamily="49" charset="0"/>
+                <a:ea typeface="Times New Roman" panose="02020603050405020304" pitchFamily="18" charset="0"/>
+                <a:cs typeface="Times New Roman" panose="02020603050405020304" pitchFamily="18" charset="0"/>
+              </a:rPr>
+              <a:t>app_localizations.dart</a:t>
+            </a:r>
+            <a:r>
+              <a:rPr lang="en-US" sz="2000" dirty="0">
+                <a:solidFill>
+                  <a:srgbClr val="00A216"/>
+                </a:solidFill>
+                <a:effectLst/>
+                <a:latin typeface="Consolas" panose="020B0609020204030204" pitchFamily="49" charset="0"/>
+                <a:ea typeface="Times New Roman" panose="02020603050405020304" pitchFamily="18" charset="0"/>
+                <a:cs typeface="Times New Roman" panose="02020603050405020304" pitchFamily="18" charset="0"/>
+              </a:rPr>
+              <a:t>'</a:t>
+            </a:r>
+            <a:r>
+              <a:rPr lang="en-US" sz="2000" dirty="0">
+                <a:solidFill>
+                  <a:srgbClr val="1E5600"/>
+                </a:solidFill>
+                <a:effectLst/>
+                <a:latin typeface="Consolas" panose="020B0609020204030204" pitchFamily="49" charset="0"/>
+                <a:ea typeface="Times New Roman" panose="02020603050405020304" pitchFamily="18" charset="0"/>
+                <a:cs typeface="Times New Roman" panose="02020603050405020304" pitchFamily="18" charset="0"/>
+              </a:rPr>
+              <a:t>;</a:t>
+            </a:r>
+          </a:p>
+          <a:p>
+            <a:pPr marL="457200" lvl="1" indent="0">
+              <a:lnSpc>
+                <a:spcPct val="107000"/>
+              </a:lnSpc>
+              <a:spcAft>
+                <a:spcPts val="800"/>
+              </a:spcAft>
+              <a:buNone/>
+              <a:tabLst>
+                <a:tab pos="581660" algn="l"/>
+                <a:tab pos="1163320" algn="l"/>
+                <a:tab pos="1744980" algn="l"/>
+                <a:tab pos="2326640" algn="l"/>
+                <a:tab pos="2908300" algn="l"/>
+                <a:tab pos="3489960" algn="l"/>
+                <a:tab pos="4071620" algn="l"/>
+                <a:tab pos="4653280" algn="l"/>
+                <a:tab pos="5234940" algn="l"/>
+                <a:tab pos="5816600" algn="l"/>
+                <a:tab pos="6398260" algn="l"/>
+                <a:tab pos="6979920" algn="l"/>
+                <a:tab pos="7561580" algn="l"/>
+                <a:tab pos="8143240" algn="l"/>
+                <a:tab pos="8724900" algn="l"/>
+                <a:tab pos="9306560" algn="l"/>
+              </a:tabLst>
+            </a:pPr>
+            <a:r>
+              <a:rPr lang="en-US" sz="2000" dirty="0">
+                <a:effectLst/>
+                <a:latin typeface="Consolas" panose="020B0609020204030204" pitchFamily="49" charset="0"/>
+                <a:ea typeface="Times New Roman" panose="02020603050405020304" pitchFamily="18" charset="0"/>
+                <a:cs typeface="Times New Roman" panose="02020603050405020304" pitchFamily="18" charset="0"/>
+              </a:rPr>
+              <a:t>...</a:t>
+            </a:r>
+            <a:endParaRPr kumimoji="0" lang="en-US" altLang="de-DE" sz="2000" b="0" i="0" u="none" strike="noStrike" cap="none" normalizeH="0" baseline="0" dirty="0">
+              <a:ln>
+                <a:noFill/>
+              </a:ln>
+              <a:solidFill>
+                <a:srgbClr val="2196F3"/>
+              </a:solidFill>
+              <a:effectLst/>
+              <a:latin typeface="Consolas" panose="020B0609020204030204" pitchFamily="49" charset="0"/>
+              <a:ea typeface="Times New Roman" panose="02020603050405020304" pitchFamily="18" charset="0"/>
+              <a:cs typeface="Courier New" panose="02070309020205020404" pitchFamily="49" charset="0"/>
             </a:endParaRPr>
           </a:p>
           <a:p>
-            <a:r>
-              <a:rPr lang="de-DE" dirty="0">
-                <a:hlinkClick r:id="rId2"/>
-              </a:rPr>
-              <a:t>https://flutter.dev/docs/development/accessibility-and-localization/internationalization</a:t>
-            </a:r>
-            <a:r>
-              <a:rPr lang="de-DE" dirty="0"/>
+            <a:pPr marL="457200" lvl="1" indent="0">
+              <a:buNone/>
+            </a:pPr>
+            <a:r>
+              <a:rPr kumimoji="0" lang="en-US" altLang="de-DE" sz="2000" b="0" i="0" u="none" strike="noStrike" cap="none" normalizeH="0" baseline="0" dirty="0">
+                <a:ln>
+                  <a:noFill/>
+                </a:ln>
+                <a:solidFill>
+                  <a:srgbClr val="2196F3"/>
+                </a:solidFill>
+                <a:effectLst/>
+                <a:latin typeface="Consolas" panose="020B0609020204030204" pitchFamily="49" charset="0"/>
+                <a:ea typeface="Times New Roman" panose="02020603050405020304" pitchFamily="18" charset="0"/>
+                <a:cs typeface="Courier New" panose="02070309020205020404" pitchFamily="49" charset="0"/>
+              </a:rPr>
+              <a:t>Text</a:t>
+            </a:r>
+            <a:r>
+              <a:rPr kumimoji="0" lang="en-US" altLang="de-DE" sz="2000" b="0" i="0" u="none" strike="noStrike" cap="none" normalizeH="0" baseline="0" dirty="0">
+                <a:ln>
+                  <a:noFill/>
+                </a:ln>
+                <a:solidFill>
+                  <a:srgbClr val="1E5600"/>
+                </a:solidFill>
+                <a:effectLst/>
+                <a:latin typeface="Consolas" panose="020B0609020204030204" pitchFamily="49" charset="0"/>
+                <a:ea typeface="Times New Roman" panose="02020603050405020304" pitchFamily="18" charset="0"/>
+                <a:cs typeface="Courier New" panose="02070309020205020404" pitchFamily="49" charset="0"/>
+              </a:rPr>
+              <a:t>(</a:t>
+            </a:r>
+            <a:br>
+              <a:rPr kumimoji="0" lang="en-US" altLang="de-DE" sz="2000" b="0" i="0" u="none" strike="noStrike" cap="none" normalizeH="0" baseline="0" dirty="0">
+                <a:ln>
+                  <a:noFill/>
+                </a:ln>
+                <a:solidFill>
+                  <a:srgbClr val="1E5600"/>
+                </a:solidFill>
+                <a:effectLst/>
+                <a:latin typeface="Consolas" panose="020B0609020204030204" pitchFamily="49" charset="0"/>
+                <a:ea typeface="Times New Roman" panose="02020603050405020304" pitchFamily="18" charset="0"/>
+                <a:cs typeface="Courier New" panose="02070309020205020404" pitchFamily="49" charset="0"/>
+              </a:rPr>
+            </a:br>
+            <a:r>
+              <a:rPr kumimoji="0" lang="en-US" altLang="de-DE" sz="2000" b="0" i="0" u="none" strike="noStrike" cap="none" normalizeH="0" baseline="0" dirty="0">
+                <a:ln>
+                  <a:noFill/>
+                </a:ln>
+                <a:solidFill>
+                  <a:srgbClr val="1E5600"/>
+                </a:solidFill>
+                <a:effectLst/>
+                <a:latin typeface="Consolas" panose="020B0609020204030204" pitchFamily="49" charset="0"/>
+                <a:ea typeface="Times New Roman" panose="02020603050405020304" pitchFamily="18" charset="0"/>
+                <a:cs typeface="Courier New" panose="02070309020205020404" pitchFamily="49" charset="0"/>
+              </a:rPr>
+              <a:t>  </a:t>
+            </a:r>
+            <a:r>
+              <a:rPr kumimoji="0" lang="en-US" altLang="de-DE" sz="2000" b="0" i="0" u="none" strike="noStrike" cap="none" normalizeH="0" baseline="0" dirty="0" err="1">
+                <a:ln>
+                  <a:noFill/>
+                </a:ln>
+                <a:solidFill>
+                  <a:srgbClr val="000000"/>
+                </a:solidFill>
+                <a:effectLst/>
+                <a:latin typeface="Consolas" panose="020B0609020204030204" pitchFamily="49" charset="0"/>
+                <a:ea typeface="Times New Roman" panose="02020603050405020304" pitchFamily="18" charset="0"/>
+                <a:cs typeface="Courier New" panose="02070309020205020404" pitchFamily="49" charset="0"/>
+              </a:rPr>
+              <a:t>AppLocalizations</a:t>
+            </a:r>
+            <a:r>
+              <a:rPr kumimoji="0" lang="en-US" altLang="de-DE" sz="2000" b="0" i="0" u="none" strike="noStrike" cap="none" normalizeH="0" baseline="0" dirty="0" err="1">
+                <a:ln>
+                  <a:noFill/>
+                </a:ln>
+                <a:solidFill>
+                  <a:srgbClr val="1E5600"/>
+                </a:solidFill>
+                <a:effectLst/>
+                <a:latin typeface="Consolas" panose="020B0609020204030204" pitchFamily="49" charset="0"/>
+                <a:ea typeface="Times New Roman" panose="02020603050405020304" pitchFamily="18" charset="0"/>
+                <a:cs typeface="Courier New" panose="02070309020205020404" pitchFamily="49" charset="0"/>
+              </a:rPr>
+              <a:t>.</a:t>
+            </a:r>
+            <a:r>
+              <a:rPr kumimoji="0" lang="en-US" altLang="de-DE" sz="2000" b="0" i="1" u="none" strike="noStrike" cap="none" normalizeH="0" baseline="0" dirty="0" err="1">
+                <a:ln>
+                  <a:noFill/>
+                </a:ln>
+                <a:solidFill>
+                  <a:srgbClr val="00627A"/>
+                </a:solidFill>
+                <a:effectLst/>
+                <a:latin typeface="Consolas" panose="020B0609020204030204" pitchFamily="49" charset="0"/>
+                <a:ea typeface="Times New Roman" panose="02020603050405020304" pitchFamily="18" charset="0"/>
+                <a:cs typeface="Courier New" panose="02070309020205020404" pitchFamily="49" charset="0"/>
+              </a:rPr>
+              <a:t>of</a:t>
+            </a:r>
+            <a:r>
+              <a:rPr kumimoji="0" lang="en-US" altLang="de-DE" sz="2000" b="0" i="0" u="none" strike="noStrike" cap="none" normalizeH="0" baseline="0" dirty="0">
+                <a:ln>
+                  <a:noFill/>
+                </a:ln>
+                <a:solidFill>
+                  <a:srgbClr val="1E5600"/>
+                </a:solidFill>
+                <a:effectLst/>
+                <a:latin typeface="Consolas" panose="020B0609020204030204" pitchFamily="49" charset="0"/>
+                <a:ea typeface="Times New Roman" panose="02020603050405020304" pitchFamily="18" charset="0"/>
+                <a:cs typeface="Courier New" panose="02070309020205020404" pitchFamily="49" charset="0"/>
+              </a:rPr>
+              <a:t>(context)!.</a:t>
+            </a:r>
+            <a:r>
+              <a:rPr kumimoji="0" lang="en-US" altLang="de-DE" sz="2000" b="0" i="0" u="none" strike="noStrike" cap="none" normalizeH="0" baseline="0" dirty="0" err="1">
+                <a:ln>
+                  <a:noFill/>
+                </a:ln>
+                <a:solidFill>
+                  <a:srgbClr val="871094"/>
+                </a:solidFill>
+                <a:effectLst/>
+                <a:latin typeface="Consolas" panose="020B0609020204030204" pitchFamily="49" charset="0"/>
+                <a:ea typeface="Times New Roman" panose="02020603050405020304" pitchFamily="18" charset="0"/>
+                <a:cs typeface="Courier New" panose="02070309020205020404" pitchFamily="49" charset="0"/>
+              </a:rPr>
+              <a:t>buttonDelete</a:t>
+            </a:r>
+            <a:r>
+              <a:rPr kumimoji="0" lang="en-US" altLang="de-DE" sz="2000" b="0" i="0" u="none" strike="noStrike" cap="none" normalizeH="0" baseline="0" dirty="0">
+                <a:ln>
+                  <a:noFill/>
+                </a:ln>
+                <a:solidFill>
+                  <a:srgbClr val="1E5600"/>
+                </a:solidFill>
+                <a:effectLst/>
+                <a:latin typeface="Consolas" panose="020B0609020204030204" pitchFamily="49" charset="0"/>
+                <a:ea typeface="Times New Roman" panose="02020603050405020304" pitchFamily="18" charset="0"/>
+                <a:cs typeface="Courier New" panose="02070309020205020404" pitchFamily="49" charset="0"/>
+              </a:rPr>
+              <a:t>,</a:t>
+            </a:r>
+            <a:br>
+              <a:rPr kumimoji="0" lang="en-US" altLang="de-DE" sz="2000" b="0" i="0" u="none" strike="noStrike" cap="none" normalizeH="0" baseline="0" dirty="0">
+                <a:ln>
+                  <a:noFill/>
+                </a:ln>
+                <a:solidFill>
+                  <a:srgbClr val="1E5600"/>
+                </a:solidFill>
+                <a:effectLst/>
+                <a:latin typeface="Consolas" panose="020B0609020204030204" pitchFamily="49" charset="0"/>
+                <a:ea typeface="Times New Roman" panose="02020603050405020304" pitchFamily="18" charset="0"/>
+                <a:cs typeface="Courier New" panose="02070309020205020404" pitchFamily="49" charset="0"/>
+              </a:rPr>
+            </a:br>
+            <a:r>
+              <a:rPr kumimoji="0" lang="en-US" altLang="de-DE" sz="2000" b="0" i="0" u="none" strike="noStrike" cap="none" normalizeH="0" baseline="0" dirty="0">
+                <a:ln>
+                  <a:noFill/>
+                </a:ln>
+                <a:solidFill>
+                  <a:srgbClr val="1E5600"/>
+                </a:solidFill>
+                <a:effectLst/>
+                <a:latin typeface="Consolas" panose="020B0609020204030204" pitchFamily="49" charset="0"/>
+                <a:ea typeface="Times New Roman" panose="02020603050405020304" pitchFamily="18" charset="0"/>
+                <a:cs typeface="Courier New" panose="02070309020205020404" pitchFamily="49" charset="0"/>
+              </a:rPr>
+              <a:t>),</a:t>
+            </a:r>
+            <a:r>
+              <a:rPr kumimoji="0" lang="de-DE" altLang="de-DE" sz="2000" b="0" i="0" u="none" strike="noStrike" cap="none" normalizeH="0" baseline="0" dirty="0">
+                <a:ln>
+                  <a:noFill/>
+                </a:ln>
+                <a:solidFill>
+                  <a:schemeClr val="tx1"/>
+                </a:solidFill>
+                <a:effectLst/>
+                <a:latin typeface="Consolas" panose="020B0609020204030204" pitchFamily="49" charset="0"/>
+              </a:rPr>
               <a:t> </a:t>
             </a:r>
+          </a:p>
+          <a:p>
+            <a:pPr marL="0" indent="0">
+              <a:buNone/>
+            </a:pPr>
+            <a:endParaRPr lang="de-DE" dirty="0"/>
           </a:p>
         </p:txBody>
       </p:sp>
@@ -9072,7 +10000,7 @@
           <p:cNvPr id="4" name="Datumsplatzhalter 3">
             <a:extLst>
               <a:ext uri="{FF2B5EF4-FFF2-40B4-BE49-F238E27FC236}">
-                <a16:creationId xmlns:a16="http://schemas.microsoft.com/office/drawing/2014/main" id="{DB043680-4CB8-4F84-98DE-F832AA091BA0}"/>
+                <a16:creationId xmlns:a16="http://schemas.microsoft.com/office/drawing/2014/main" id="{097C9D70-B172-4776-9F14-342574523EA3}"/>
               </a:ext>
             </a:extLst>
           </p:cNvPr>
@@ -9090,7 +10018,7 @@
           <a:p>
             <a:fld id="{C312227E-C521-4FD0-AB53-4510B2685A9C}" type="datetime1">
               <a:rPr lang="de-DE" smtClean="0"/>
-              <a:t>07.04.2022</a:t>
+              <a:t>01.06.2023</a:t>
             </a:fld>
             <a:endParaRPr lang="de-DE"/>
           </a:p>
@@ -9101,7 +10029,7 @@
           <p:cNvPr id="5" name="Fußzeilenplatzhalter 4">
             <a:extLst>
               <a:ext uri="{FF2B5EF4-FFF2-40B4-BE49-F238E27FC236}">
-                <a16:creationId xmlns:a16="http://schemas.microsoft.com/office/drawing/2014/main" id="{6788967F-8170-4FF2-98B5-823C6FC3453E}"/>
+                <a16:creationId xmlns:a16="http://schemas.microsoft.com/office/drawing/2014/main" id="{7650FF09-BC12-46F0-9E89-80FE0ADADF0D}"/>
               </a:ext>
             </a:extLst>
           </p:cNvPr>
@@ -9129,7 +10057,7 @@
           <p:cNvPr id="6" name="Foliennummernplatzhalter 5">
             <a:extLst>
               <a:ext uri="{FF2B5EF4-FFF2-40B4-BE49-F238E27FC236}">
-                <a16:creationId xmlns:a16="http://schemas.microsoft.com/office/drawing/2014/main" id="{A10E42E8-5647-4DAE-B9CB-A6BB7731445B}"/>
+                <a16:creationId xmlns:a16="http://schemas.microsoft.com/office/drawing/2014/main" id="{33708067-0312-4947-A020-B48EE3E34260}"/>
               </a:ext>
             </a:extLst>
           </p:cNvPr>
@@ -9156,7 +10084,7 @@
     </p:spTree>
     <p:extLst>
       <p:ext uri="{BB962C8B-B14F-4D97-AF65-F5344CB8AC3E}">
-        <p14:creationId xmlns:p14="http://schemas.microsoft.com/office/powerpoint/2010/main" val="1090781285"/>
+        <p14:creationId xmlns:p14="http://schemas.microsoft.com/office/powerpoint/2010/main" val="2690091677"/>
       </p:ext>
     </p:extLst>
   </p:cSld>

</xml_diff>